<commit_message>
Art sent me minor edits for Excelling to Another Level
</commit_message>
<xml_diff>
--- a/Excelling_to_Another_Level_with_SAS/doc/2444-2018PowerPoint.pptx
+++ b/Excelling_to_Another_Level_with_SAS/doc/2444-2018PowerPoint.pptx
@@ -5,10 +5,10 @@
     <p:sldMasterId id="2147483925" r:id="rId1"/>
   </p:sldMasterIdLst>
   <p:notesMasterIdLst>
-    <p:notesMasterId r:id="rId37"/>
+    <p:notesMasterId r:id="rId39"/>
   </p:notesMasterIdLst>
   <p:handoutMasterIdLst>
-    <p:handoutMasterId r:id="rId38"/>
+    <p:handoutMasterId r:id="rId40"/>
   </p:handoutMasterIdLst>
   <p:sldIdLst>
     <p:sldId id="257" r:id="rId2"/>
@@ -43,9 +43,11 @@
     <p:sldId id="293" r:id="rId31"/>
     <p:sldId id="294" r:id="rId32"/>
     <p:sldId id="295" r:id="rId33"/>
-    <p:sldId id="314" r:id="rId34"/>
+    <p:sldId id="315" r:id="rId34"/>
     <p:sldId id="297" r:id="rId35"/>
     <p:sldId id="299" r:id="rId36"/>
+    <p:sldId id="316" r:id="rId37"/>
+    <p:sldId id="317" r:id="rId38"/>
   </p:sldIdLst>
   <p:sldSz cx="9144000" cy="5143500" type="screen16x9"/>
   <p:notesSz cx="6858000" cy="9144000"/>
@@ -146,7 +148,7 @@
   </p:defaultTextStyle>
   <p:extLst>
     <p:ext uri="{EFAFB233-063F-42B5-8137-9DF3F51BA10A}">
-      <p15:sldGuideLst xmlns:p15="http://schemas.microsoft.com/office/powerpoint/2012/main">
+      <p15:sldGuideLst xmlns="" xmlns:p15="http://schemas.microsoft.com/office/powerpoint/2012/main">
         <p15:guide id="1" orient="horz" pos="1616">
           <p15:clr>
             <a:srgbClr val="A4A3A4"/>
@@ -165,7 +167,7 @@
       </p15:sldGuideLst>
     </p:ext>
     <p:ext uri="{2D200454-40CA-4A62-9FC3-DE9A4176ACB9}">
-      <p15:notesGuideLst xmlns:p15="http://schemas.microsoft.com/office/powerpoint/2012/main">
+      <p15:notesGuideLst xmlns="" xmlns:p15="http://schemas.microsoft.com/office/powerpoint/2012/main">
         <p15:guide id="1" orient="horz" pos="2881">
           <p15:clr>
             <a:srgbClr val="A4A3A4"/>
@@ -981,6 +983,72 @@
 </p:notes>
 </file>
 
+<file path=ppt/notesSlides/notesSlide2.xml><?xml version="1.0" encoding="utf-8"?>
+<p:notes xmlns:a="http://schemas.openxmlformats.org/drawingml/2006/main" xmlns:r="http://schemas.openxmlformats.org/officeDocument/2006/relationships" xmlns:p="http://schemas.openxmlformats.org/presentationml/2006/main">
+  <p:cSld>
+    <p:spTree>
+      <p:nvGrpSpPr>
+        <p:cNvPr id="1" name=""/>
+        <p:cNvGrpSpPr/>
+        <p:nvPr/>
+      </p:nvGrpSpPr>
+      <p:grpSpPr>
+        <a:xfrm>
+          <a:off x="0" y="0"/>
+          <a:ext cx="0" cy="0"/>
+          <a:chOff x="0" y="0"/>
+          <a:chExt cx="0" cy="0"/>
+        </a:xfrm>
+      </p:grpSpPr>
+      <p:sp>
+        <p:nvSpPr>
+          <p:cNvPr id="2" name="Slide Image Placeholder 1"/>
+          <p:cNvSpPr>
+            <a:spLocks noGrp="1" noRot="1" noChangeAspect="1"/>
+          </p:cNvSpPr>
+          <p:nvPr>
+            <p:ph type="sldImg"/>
+          </p:nvPr>
+        </p:nvSpPr>
+        <p:spPr>
+          <a:xfrm>
+            <a:off x="641350" y="1162050"/>
+            <a:ext cx="5575300" cy="3135313"/>
+          </a:xfrm>
+        </p:spPr>
+      </p:sp>
+      <p:sp>
+        <p:nvSpPr>
+          <p:cNvPr id="3" name="Notes Placeholder 2"/>
+          <p:cNvSpPr>
+            <a:spLocks noGrp="1"/>
+          </p:cNvSpPr>
+          <p:nvPr>
+            <p:ph type="body" idx="1"/>
+          </p:nvPr>
+        </p:nvSpPr>
+        <p:spPr/>
+        <p:txBody>
+          <a:bodyPr/>
+          <a:lstStyle/>
+          <a:p>
+            <a:endParaRPr lang="en-US" dirty="0"/>
+          </a:p>
+        </p:txBody>
+      </p:sp>
+    </p:spTree>
+    <p:extLst>
+      <p:ext uri="{BB962C8B-B14F-4D97-AF65-F5344CB8AC3E}">
+        <p14:creationId xmlns:p14="http://schemas.microsoft.com/office/powerpoint/2010/main" val="88338643"/>
+      </p:ext>
+    </p:extLst>
+  </p:cSld>
+  <p:clrMapOvr>
+    <a:masterClrMapping/>
+  </p:clrMapOvr>
+</p:notes>
+</file>
+
 <file path=ppt/slideLayouts/slideLayout1.xml><?xml version="1.0" encoding="utf-8"?>
 <p:sldLayout xmlns:a="http://schemas.openxmlformats.org/drawingml/2006/main" xmlns:r="http://schemas.openxmlformats.org/officeDocument/2006/relationships" xmlns:p="http://schemas.openxmlformats.org/presentationml/2006/main" showMasterSp="0" preserve="1" userDrawn="1">
   <p:cSld name="Title Slide">
@@ -1538,6 +1606,362 @@
       </p:par>
     </p:tnLst>
   </p:timing>
+</p:sldLayout>
+</file>
+
+<file path=ppt/slideLayouts/slideLayout14.xml><?xml version="1.0" encoding="utf-8"?>
+<p:sldLayout xmlns:a="http://schemas.openxmlformats.org/drawingml/2006/main" xmlns:r="http://schemas.openxmlformats.org/officeDocument/2006/relationships" xmlns:p="http://schemas.openxmlformats.org/presentationml/2006/main" userDrawn="1">
+  <p:cSld name="1_Midnight header bar">
+    <p:spTree>
+      <p:nvGrpSpPr>
+        <p:cNvPr id="1" name=""/>
+        <p:cNvGrpSpPr/>
+        <p:nvPr/>
+      </p:nvGrpSpPr>
+      <p:grpSpPr>
+        <a:xfrm>
+          <a:off x="0" y="0"/>
+          <a:ext cx="0" cy="0"/>
+          <a:chOff x="0" y="0"/>
+          <a:chExt cx="0" cy="0"/>
+        </a:xfrm>
+      </p:grpSpPr>
+      <p:sp>
+        <p:nvSpPr>
+          <p:cNvPr id="8" name="Rectangle 7"/>
+          <p:cNvSpPr/>
+          <p:nvPr userDrawn="1"/>
+        </p:nvSpPr>
+        <p:spPr>
+          <a:xfrm>
+            <a:off x="0" y="0"/>
+            <a:ext cx="9144000" cy="758142"/>
+          </a:xfrm>
+          <a:prstGeom prst="rect">
+            <a:avLst/>
+          </a:prstGeom>
+          <a:solidFill>
+            <a:schemeClr val="tx2"/>
+          </a:solidFill>
+          <a:ln>
+            <a:noFill/>
+          </a:ln>
+        </p:spPr>
+        <p:style>
+          <a:lnRef idx="2">
+            <a:schemeClr val="accent1">
+              <a:shade val="50000"/>
+            </a:schemeClr>
+          </a:lnRef>
+          <a:fillRef idx="1">
+            <a:schemeClr val="accent1"/>
+          </a:fillRef>
+          <a:effectRef idx="0">
+            <a:schemeClr val="accent1"/>
+          </a:effectRef>
+          <a:fontRef idx="minor">
+            <a:schemeClr val="lt1"/>
+          </a:fontRef>
+        </p:style>
+        <p:txBody>
+          <a:bodyPr rot="0" spcFirstLastPara="0" vertOverflow="overflow" horzOverflow="overflow" vert="horz" wrap="square" lIns="91440" tIns="45720" rIns="91440" bIns="45720" numCol="1" spcCol="0" rtlCol="0" fromWordArt="0" anchor="ctr" anchorCtr="0" forceAA="0" compatLnSpc="1">
+            <a:prstTxWarp prst="textNoShape">
+              <a:avLst/>
+            </a:prstTxWarp>
+            <a:noAutofit/>
+          </a:bodyPr>
+          <a:lstStyle/>
+          <a:p>
+            <a:pPr algn="ctr"/>
+            <a:endParaRPr lang="en-US" dirty="0">
+              <a:solidFill>
+                <a:schemeClr val="accent1"/>
+              </a:solidFill>
+            </a:endParaRPr>
+          </a:p>
+        </p:txBody>
+      </p:sp>
+      <p:sp>
+        <p:nvSpPr>
+          <p:cNvPr id="2" name="Title 1"/>
+          <p:cNvSpPr>
+            <a:spLocks noGrp="1"/>
+          </p:cNvSpPr>
+          <p:nvPr>
+            <p:ph type="title" hasCustomPrompt="1"/>
+          </p:nvPr>
+        </p:nvSpPr>
+        <p:spPr>
+          <a:xfrm>
+            <a:off x="626364" y="155688"/>
+            <a:ext cx="7891272" cy="457200"/>
+          </a:xfrm>
+          <a:prstGeom prst="rect">
+            <a:avLst/>
+          </a:prstGeom>
+        </p:spPr>
+        <p:txBody>
+          <a:bodyPr anchor="ctr" anchorCtr="0">
+            <a:noAutofit/>
+          </a:bodyPr>
+          <a:lstStyle>
+            <a:lvl1pPr algn="ctr">
+              <a:defRPr baseline="0">
+                <a:solidFill>
+                  <a:schemeClr val="bg1"/>
+                </a:solidFill>
+              </a:defRPr>
+            </a:lvl1pPr>
+          </a:lstStyle>
+          <a:p>
+            <a:r>
+              <a:rPr lang="en-US" dirty="0"/>
+              <a:t>Click to Edit Title</a:t>
+            </a:r>
+          </a:p>
+        </p:txBody>
+      </p:sp>
+      <p:sp>
+        <p:nvSpPr>
+          <p:cNvPr id="5" name="Text Placeholder 2"/>
+          <p:cNvSpPr>
+            <a:spLocks noGrp="1"/>
+          </p:cNvSpPr>
+          <p:nvPr>
+            <p:ph type="body" sz="quarter" idx="11" hasCustomPrompt="1"/>
+          </p:nvPr>
+        </p:nvSpPr>
+        <p:spPr>
+          <a:xfrm flipH="1">
+            <a:off x="626364" y="969461"/>
+            <a:ext cx="7891272" cy="274320"/>
+          </a:xfrm>
+          <a:prstGeom prst="rect">
+            <a:avLst/>
+          </a:prstGeom>
+        </p:spPr>
+        <p:txBody>
+          <a:bodyPr wrap="square" anchor="ctr" anchorCtr="0">
+            <a:noAutofit/>
+          </a:bodyPr>
+          <a:lstStyle>
+            <a:lvl1pPr marL="0" indent="0" algn="ctr">
+              <a:lnSpc>
+                <a:spcPct val="100000"/>
+              </a:lnSpc>
+              <a:spcBef>
+                <a:spcPts val="0"/>
+              </a:spcBef>
+              <a:buFont typeface="Arial" pitchFamily="34" charset="0"/>
+              <a:buNone/>
+              <a:defRPr sz="2200" b="0" cap="none" baseline="0">
+                <a:solidFill>
+                  <a:schemeClr val="accent6"/>
+                </a:solidFill>
+                <a:latin typeface="+mj-lt"/>
+              </a:defRPr>
+            </a:lvl1pPr>
+          </a:lstStyle>
+          <a:p>
+            <a:pPr lvl="0"/>
+            <a:r>
+              <a:rPr lang="en-US" dirty="0"/>
+              <a:t>Click to edit subtitle</a:t>
+            </a:r>
+          </a:p>
+        </p:txBody>
+      </p:sp>
+      <p:sp>
+        <p:nvSpPr>
+          <p:cNvPr id="6" name="Content Placeholder 3"/>
+          <p:cNvSpPr>
+            <a:spLocks noGrp="1"/>
+          </p:cNvSpPr>
+          <p:nvPr>
+            <p:ph sz="quarter" idx="12" hasCustomPrompt="1"/>
+          </p:nvPr>
+        </p:nvSpPr>
+        <p:spPr>
+          <a:xfrm>
+            <a:off x="626364" y="1362752"/>
+            <a:ext cx="7891272" cy="3358896"/>
+          </a:xfrm>
+          <a:prstGeom prst="rect">
+            <a:avLst/>
+          </a:prstGeom>
+        </p:spPr>
+        <p:txBody>
+          <a:bodyPr wrap="square" anchor="t" anchorCtr="0">
+            <a:normAutofit/>
+          </a:bodyPr>
+          <a:lstStyle>
+            <a:lvl1pPr>
+              <a:defRPr baseline="0">
+                <a:solidFill>
+                  <a:schemeClr val="tx2"/>
+                </a:solidFill>
+              </a:defRPr>
+            </a:lvl1pPr>
+            <a:lvl2pPr>
+              <a:buClr>
+                <a:schemeClr val="tx1">
+                  <a:lumMod val="65000"/>
+                  <a:lumOff val="35000"/>
+                </a:schemeClr>
+              </a:buClr>
+              <a:defRPr baseline="0">
+                <a:solidFill>
+                  <a:schemeClr val="tx1">
+                    <a:lumMod val="65000"/>
+                    <a:lumOff val="35000"/>
+                  </a:schemeClr>
+                </a:solidFill>
+              </a:defRPr>
+            </a:lvl2pPr>
+            <a:lvl3pPr>
+              <a:buClr>
+                <a:schemeClr val="tx1">
+                  <a:lumMod val="65000"/>
+                  <a:lumOff val="35000"/>
+                </a:schemeClr>
+              </a:buClr>
+              <a:defRPr baseline="0">
+                <a:solidFill>
+                  <a:schemeClr val="tx1">
+                    <a:lumMod val="65000"/>
+                    <a:lumOff val="35000"/>
+                  </a:schemeClr>
+                </a:solidFill>
+              </a:defRPr>
+            </a:lvl3pPr>
+            <a:lvl4pPr>
+              <a:buClr>
+                <a:schemeClr val="tx1">
+                  <a:lumMod val="65000"/>
+                  <a:lumOff val="35000"/>
+                </a:schemeClr>
+              </a:buClr>
+              <a:defRPr baseline="0">
+                <a:solidFill>
+                  <a:schemeClr val="tx1">
+                    <a:lumMod val="65000"/>
+                    <a:lumOff val="35000"/>
+                  </a:schemeClr>
+                </a:solidFill>
+              </a:defRPr>
+            </a:lvl4pPr>
+            <a:lvl5pPr>
+              <a:buClr>
+                <a:schemeClr val="tx1">
+                  <a:lumMod val="65000"/>
+                  <a:lumOff val="35000"/>
+                </a:schemeClr>
+              </a:buClr>
+              <a:defRPr baseline="0">
+                <a:solidFill>
+                  <a:schemeClr val="tx1">
+                    <a:lumMod val="65000"/>
+                    <a:lumOff val="35000"/>
+                  </a:schemeClr>
+                </a:solidFill>
+              </a:defRPr>
+            </a:lvl5pPr>
+          </a:lstStyle>
+          <a:p>
+            <a:pPr lvl="0"/>
+            <a:r>
+              <a:rPr lang="en-US" dirty="0"/>
+              <a:t>Click to add text or click an icon to add other content types.</a:t>
+            </a:r>
+          </a:p>
+          <a:p>
+            <a:pPr lvl="1"/>
+            <a:r>
+              <a:rPr lang="en-US" dirty="0"/>
+              <a:t>Second level</a:t>
+            </a:r>
+          </a:p>
+          <a:p>
+            <a:pPr lvl="2"/>
+            <a:r>
+              <a:rPr lang="en-US" dirty="0"/>
+              <a:t>Third level</a:t>
+            </a:r>
+          </a:p>
+        </p:txBody>
+      </p:sp>
+      <p:pic>
+        <p:nvPicPr>
+          <p:cNvPr id="7" name="Picture 6"/>
+          <p:cNvPicPr>
+            <a:picLocks noChangeAspect="1"/>
+          </p:cNvPicPr>
+          <p:nvPr userDrawn="1"/>
+        </p:nvPicPr>
+        <p:blipFill>
+          <a:blip r:embed="rId2" cstate="print">
+            <a:extLst>
+              <a:ext uri="{28A0092B-C50C-407E-A947-70E740481C1C}">
+                <a14:useLocalDpi xmlns:a14="http://schemas.microsoft.com/office/drawing/2010/main" val="0"/>
+              </a:ext>
+            </a:extLst>
+          </a:blip>
+          <a:stretch>
+            <a:fillRect/>
+          </a:stretch>
+        </p:blipFill>
+        <p:spPr>
+          <a:xfrm>
+            <a:off x="0" y="1734"/>
+            <a:ext cx="1342664" cy="824476"/>
+          </a:xfrm>
+          <a:prstGeom prst="rect">
+            <a:avLst/>
+          </a:prstGeom>
+        </p:spPr>
+      </p:pic>
+      <p:sp>
+        <p:nvSpPr>
+          <p:cNvPr id="9" name="TextBox 8"/>
+          <p:cNvSpPr txBox="1"/>
+          <p:nvPr userDrawn="1"/>
+        </p:nvSpPr>
+        <p:spPr>
+          <a:xfrm>
+            <a:off x="8489992" y="53524"/>
+            <a:ext cx="654008" cy="276999"/>
+          </a:xfrm>
+          <a:prstGeom prst="rect">
+            <a:avLst/>
+          </a:prstGeom>
+          <a:noFill/>
+        </p:spPr>
+        <p:txBody>
+          <a:bodyPr wrap="square" rtlCol="0">
+            <a:spAutoFit/>
+          </a:bodyPr>
+          <a:lstStyle/>
+          <a:p>
+            <a:r>
+              <a:rPr lang="en-US" sz="1200" b="1" dirty="0">
+                <a:solidFill>
+                  <a:schemeClr val="accent6"/>
+                </a:solidFill>
+              </a:rPr>
+              <a:t>#SASGF</a:t>
+            </a:r>
+          </a:p>
+        </p:txBody>
+      </p:sp>
+    </p:spTree>
+    <p:extLst/>
+  </p:cSld>
+  <p:clrMapOvr>
+    <a:masterClrMapping/>
+  </p:clrMapOvr>
+  <p:transition>
+    <p:fade/>
+  </p:transition>
 </p:sldLayout>
 </file>
 
@@ -2132,7 +2556,7 @@
     <p:bg>
       <p:bgPr>
         <a:blipFill dpi="0" rotWithShape="1">
-          <a:blip r:embed="rId15">
+          <a:blip r:embed="rId16">
             <a:lum/>
           </a:blip>
           <a:srcRect/>
@@ -2279,6 +2703,7 @@
     <p:sldLayoutId id="2147483935" r:id="rId11"/>
     <p:sldLayoutId id="2147483941" r:id="rId12"/>
     <p:sldLayoutId id="2147483963" r:id="rId13"/>
+    <p:sldLayoutId id="2147483983" r:id="rId14"/>
   </p:sldLayoutIdLst>
   <p:transition>
     <p:fade/>
@@ -3475,17 +3900,7 @@
                 <a:latin typeface="Arial Rounded MT Bold" pitchFamily="34" charset="0"/>
                 <a:ea typeface="ＭＳ Ｐゴシック" pitchFamily="34" charset="-128"/>
               </a:rPr>
-              <a:t>Matthew </a:t>
-            </a:r>
-            <a:r>
-              <a:rPr sz="2800" b="1" dirty="0" smtClean="0">
-                <a:solidFill>
-                  <a:srgbClr val="00C1D0"/>
-                </a:solidFill>
-                <a:latin typeface="Arial Rounded MT Bold" pitchFamily="34" charset="0"/>
-                <a:ea typeface="ＭＳ Ｐゴシック" pitchFamily="34" charset="-128"/>
-              </a:rPr>
-              <a:t>Kastin</a:t>
+              <a:t>Matthew Kastin</a:t>
             </a:r>
             <a:endParaRPr sz="2800" b="1" dirty="0">
               <a:solidFill>
@@ -21979,7 +22394,7 @@
                                       <p:cBhvr override="childStyle">
                                         <p:cTn id="79" dur="500" fill="hold"/>
                                         <p:tgtEl>
-                                          <p:spTgt spid="20"/>
+                                          <p:spTgt spid="11"/>
                                         </p:tgtEl>
                                         <p:attrNameLst>
                                           <p:attrName>style.color</p:attrName>
@@ -21993,7 +22408,7 @@
                                       <p:cBhvr>
                                         <p:cTn id="80" dur="500" fill="hold"/>
                                         <p:tgtEl>
-                                          <p:spTgt spid="20"/>
+                                          <p:spTgt spid="11"/>
                                         </p:tgtEl>
                                         <p:attrNameLst>
                                           <p:attrName>fillcolor</p:attrName>
@@ -22007,7 +22422,7 @@
                                       <p:cBhvr>
                                         <p:cTn id="81" dur="500" fill="hold"/>
                                         <p:tgtEl>
-                                          <p:spTgt spid="20"/>
+                                          <p:spTgt spid="11"/>
                                         </p:tgtEl>
                                         <p:attrNameLst>
                                           <p:attrName>stroke.color</p:attrName>
@@ -22020,71 +22435,6 @@
                                     <p:set>
                                       <p:cBhvr>
                                         <p:cTn id="82" dur="500" fill="hold"/>
-                                        <p:tgtEl>
-                                          <p:spTgt spid="20"/>
-                                        </p:tgtEl>
-                                        <p:attrNameLst>
-                                          <p:attrName>fill.type</p:attrName>
-                                        </p:attrNameLst>
-                                      </p:cBhvr>
-                                      <p:to>
-                                        <p:strVal val="solid"/>
-                                      </p:to>
-                                    </p:set>
-                                  </p:childTnLst>
-                                </p:cTn>
-                              </p:par>
-                              <p:par>
-                                <p:cTn id="83" presetID="30" presetClass="emph" presetSubtype="0" fill="hold" grpId="1" nodeType="withEffect">
-                                  <p:stCondLst>
-                                    <p:cond delay="0"/>
-                                  </p:stCondLst>
-                                  <p:childTnLst>
-                                    <p:animClr clrSpc="hsl" dir="cw">
-                                      <p:cBhvr override="childStyle">
-                                        <p:cTn id="84" dur="500" fill="hold"/>
-                                        <p:tgtEl>
-                                          <p:spTgt spid="11"/>
-                                        </p:tgtEl>
-                                        <p:attrNameLst>
-                                          <p:attrName>style.color</p:attrName>
-                                        </p:attrNameLst>
-                                      </p:cBhvr>
-                                      <p:by>
-                                        <p:hsl h="0" s="12549" l="25098"/>
-                                      </p:by>
-                                    </p:animClr>
-                                    <p:animClr clrSpc="hsl" dir="cw">
-                                      <p:cBhvr>
-                                        <p:cTn id="85" dur="500" fill="hold"/>
-                                        <p:tgtEl>
-                                          <p:spTgt spid="11"/>
-                                        </p:tgtEl>
-                                        <p:attrNameLst>
-                                          <p:attrName>fillcolor</p:attrName>
-                                        </p:attrNameLst>
-                                      </p:cBhvr>
-                                      <p:by>
-                                        <p:hsl h="0" s="12549" l="25098"/>
-                                      </p:by>
-                                    </p:animClr>
-                                    <p:animClr clrSpc="hsl" dir="cw">
-                                      <p:cBhvr>
-                                        <p:cTn id="86" dur="500" fill="hold"/>
-                                        <p:tgtEl>
-                                          <p:spTgt spid="11"/>
-                                        </p:tgtEl>
-                                        <p:attrNameLst>
-                                          <p:attrName>stroke.color</p:attrName>
-                                        </p:attrNameLst>
-                                      </p:cBhvr>
-                                      <p:by>
-                                        <p:hsl h="0" s="12549" l="25098"/>
-                                      </p:by>
-                                    </p:animClr>
-                                    <p:set>
-                                      <p:cBhvr>
-                                        <p:cTn id="87" dur="500" fill="hold"/>
                                         <p:tgtEl>
                                           <p:spTgt spid="11"/>
                                         </p:tgtEl>
@@ -22145,7 +22495,6 @@
       <p:bldP spid="13" grpId="1" animBg="1"/>
       <p:bldP spid="19" grpId="0"/>
       <p:bldP spid="20" grpId="0" animBg="1"/>
-      <p:bldP spid="20" grpId="1" animBg="1"/>
     </p:bldLst>
   </p:timing>
 </p:sld>
@@ -23216,6 +23565,9 @@
                     <p:cTn id="3" fill="hold">
                       <p:stCondLst>
                         <p:cond delay="indefinite"/>
+                        <p:cond evt="onBegin" delay="0">
+                          <p:tn val="2"/>
+                        </p:cond>
                       </p:stCondLst>
                       <p:childTnLst>
                         <p:par>
@@ -23225,237 +23577,14 @@
                             </p:stCondLst>
                             <p:childTnLst>
                               <p:par>
-                                <p:cTn id="5" presetID="10" presetClass="entr" presetSubtype="0" fill="hold" grpId="1" nodeType="clickEffect">
-                                  <p:stCondLst>
-                                    <p:cond delay="0"/>
-                                  </p:stCondLst>
-                                  <p:childTnLst>
-                                    <p:set>
-                                      <p:cBhvr>
-                                        <p:cTn id="6" dur="1" fill="hold">
-                                          <p:stCondLst>
-                                            <p:cond delay="0"/>
-                                          </p:stCondLst>
-                                        </p:cTn>
-                                        <p:tgtEl>
-                                          <p:spTgt spid="18"/>
-                                        </p:tgtEl>
-                                        <p:attrNameLst>
-                                          <p:attrName>style.visibility</p:attrName>
-                                        </p:attrNameLst>
-                                      </p:cBhvr>
-                                      <p:to>
-                                        <p:strVal val="visible"/>
-                                      </p:to>
-                                    </p:set>
-                                    <p:animEffect transition="in" filter="fade">
-                                      <p:cBhvr>
-                                        <p:cTn id="7" dur="500"/>
-                                        <p:tgtEl>
-                                          <p:spTgt spid="18"/>
-                                        </p:tgtEl>
-                                      </p:cBhvr>
-                                    </p:animEffect>
-                                  </p:childTnLst>
-                                </p:cTn>
-                              </p:par>
-                              <p:par>
-                                <p:cTn id="8" presetID="10" presetClass="entr" presetSubtype="0" fill="hold" grpId="1" nodeType="withEffect">
-                                  <p:stCondLst>
-                                    <p:cond delay="0"/>
-                                  </p:stCondLst>
-                                  <p:childTnLst>
-                                    <p:set>
-                                      <p:cBhvr>
-                                        <p:cTn id="9" dur="1" fill="hold">
-                                          <p:stCondLst>
-                                            <p:cond delay="0"/>
-                                          </p:stCondLst>
-                                        </p:cTn>
-                                        <p:tgtEl>
-                                          <p:spTgt spid="22"/>
-                                        </p:tgtEl>
-                                        <p:attrNameLst>
-                                          <p:attrName>style.visibility</p:attrName>
-                                        </p:attrNameLst>
-                                      </p:cBhvr>
-                                      <p:to>
-                                        <p:strVal val="visible"/>
-                                      </p:to>
-                                    </p:set>
-                                    <p:animEffect transition="in" filter="fade">
-                                      <p:cBhvr>
-                                        <p:cTn id="10" dur="500"/>
-                                        <p:tgtEl>
-                                          <p:spTgt spid="22"/>
-                                        </p:tgtEl>
-                                      </p:cBhvr>
-                                    </p:animEffect>
-                                  </p:childTnLst>
-                                </p:cTn>
-                              </p:par>
-                            </p:childTnLst>
-                          </p:cTn>
-                        </p:par>
-                      </p:childTnLst>
-                    </p:cTn>
-                  </p:par>
-                  <p:par>
-                    <p:cTn id="11" fill="hold">
-                      <p:stCondLst>
-                        <p:cond delay="indefinite"/>
-                      </p:stCondLst>
-                      <p:childTnLst>
-                        <p:par>
-                          <p:cTn id="12" fill="hold">
-                            <p:stCondLst>
-                              <p:cond delay="0"/>
-                            </p:stCondLst>
-                            <p:childTnLst>
-                              <p:par>
-                                <p:cTn id="13" presetID="10" presetClass="entr" presetSubtype="0" fill="hold" grpId="0" nodeType="clickEffect">
-                                  <p:stCondLst>
-                                    <p:cond delay="0"/>
-                                  </p:stCondLst>
-                                  <p:childTnLst>
-                                    <p:set>
-                                      <p:cBhvr>
-                                        <p:cTn id="14" dur="1" fill="hold">
-                                          <p:stCondLst>
-                                            <p:cond delay="0"/>
-                                          </p:stCondLst>
-                                        </p:cTn>
-                                        <p:tgtEl>
-                                          <p:spTgt spid="24"/>
-                                        </p:tgtEl>
-                                        <p:attrNameLst>
-                                          <p:attrName>style.visibility</p:attrName>
-                                        </p:attrNameLst>
-                                      </p:cBhvr>
-                                      <p:to>
-                                        <p:strVal val="visible"/>
-                                      </p:to>
-                                    </p:set>
-                                    <p:animEffect transition="in" filter="fade">
-                                      <p:cBhvr>
-                                        <p:cTn id="15" dur="500"/>
-                                        <p:tgtEl>
-                                          <p:spTgt spid="24"/>
-                                        </p:tgtEl>
-                                      </p:cBhvr>
-                                    </p:animEffect>
-                                  </p:childTnLst>
-                                </p:cTn>
-                              </p:par>
-                              <p:par>
-                                <p:cTn id="16" presetID="10" presetClass="entr" presetSubtype="0" fill="hold" grpId="0" nodeType="withEffect">
-                                  <p:stCondLst>
-                                    <p:cond delay="0"/>
-                                  </p:stCondLst>
-                                  <p:childTnLst>
-                                    <p:set>
-                                      <p:cBhvr>
-                                        <p:cTn id="17" dur="1" fill="hold">
-                                          <p:stCondLst>
-                                            <p:cond delay="0"/>
-                                          </p:stCondLst>
-                                        </p:cTn>
-                                        <p:tgtEl>
-                                          <p:spTgt spid="25"/>
-                                        </p:tgtEl>
-                                        <p:attrNameLst>
-                                          <p:attrName>style.visibility</p:attrName>
-                                        </p:attrNameLst>
-                                      </p:cBhvr>
-                                      <p:to>
-                                        <p:strVal val="visible"/>
-                                      </p:to>
-                                    </p:set>
-                                    <p:animEffect transition="in" filter="fade">
-                                      <p:cBhvr>
-                                        <p:cTn id="18" dur="500"/>
-                                        <p:tgtEl>
-                                          <p:spTgt spid="25"/>
-                                        </p:tgtEl>
-                                      </p:cBhvr>
-                                    </p:animEffect>
-                                  </p:childTnLst>
-                                </p:cTn>
-                              </p:par>
-                              <p:par>
-                                <p:cTn id="19" presetID="30" presetClass="emph" presetSubtype="0" fill="hold" grpId="0" nodeType="withEffect">
+                                <p:cTn id="5" presetID="30" presetClass="emph" presetSubtype="0" fill="hold" grpId="0" nodeType="withEffect">
                                   <p:stCondLst>
                                     <p:cond delay="0"/>
                                   </p:stCondLst>
                                   <p:childTnLst>
                                     <p:animClr clrSpc="hsl" dir="cw">
                                       <p:cBhvr override="childStyle">
-                                        <p:cTn id="20" dur="500" fill="hold"/>
-                                        <p:tgtEl>
-                                          <p:spTgt spid="18"/>
-                                        </p:tgtEl>
-                                        <p:attrNameLst>
-                                          <p:attrName>style.color</p:attrName>
-                                        </p:attrNameLst>
-                                      </p:cBhvr>
-                                      <p:by>
-                                        <p:hsl h="0" s="12549" l="25098"/>
-                                      </p:by>
-                                    </p:animClr>
-                                    <p:animClr clrSpc="hsl" dir="cw">
-                                      <p:cBhvr>
-                                        <p:cTn id="21" dur="500" fill="hold"/>
-                                        <p:tgtEl>
-                                          <p:spTgt spid="18"/>
-                                        </p:tgtEl>
-                                        <p:attrNameLst>
-                                          <p:attrName>fillcolor</p:attrName>
-                                        </p:attrNameLst>
-                                      </p:cBhvr>
-                                      <p:by>
-                                        <p:hsl h="0" s="12549" l="25098"/>
-                                      </p:by>
-                                    </p:animClr>
-                                    <p:animClr clrSpc="hsl" dir="cw">
-                                      <p:cBhvr>
-                                        <p:cTn id="22" dur="500" fill="hold"/>
-                                        <p:tgtEl>
-                                          <p:spTgt spid="18"/>
-                                        </p:tgtEl>
-                                        <p:attrNameLst>
-                                          <p:attrName>stroke.color</p:attrName>
-                                        </p:attrNameLst>
-                                      </p:cBhvr>
-                                      <p:by>
-                                        <p:hsl h="0" s="12549" l="25098"/>
-                                      </p:by>
-                                    </p:animClr>
-                                    <p:set>
-                                      <p:cBhvr>
-                                        <p:cTn id="23" dur="500" fill="hold"/>
-                                        <p:tgtEl>
-                                          <p:spTgt spid="18"/>
-                                        </p:tgtEl>
-                                        <p:attrNameLst>
-                                          <p:attrName>fill.type</p:attrName>
-                                        </p:attrNameLst>
-                                      </p:cBhvr>
-                                      <p:to>
-                                        <p:strVal val="solid"/>
-                                      </p:to>
-                                    </p:set>
-                                  </p:childTnLst>
-                                </p:cTn>
-                              </p:par>
-                              <p:par>
-                                <p:cTn id="24" presetID="30" presetClass="emph" presetSubtype="0" fill="hold" grpId="0" nodeType="withEffect">
-                                  <p:stCondLst>
-                                    <p:cond delay="0"/>
-                                  </p:stCondLst>
-                                  <p:childTnLst>
-                                    <p:animClr clrSpc="hsl" dir="cw">
-                                      <p:cBhvr override="childStyle">
-                                        <p:cTn id="25" dur="500" fill="hold"/>
+                                        <p:cTn id="6" dur="10" fill="hold"/>
                                         <p:tgtEl>
                                           <p:spTgt spid="22"/>
                                         </p:tgtEl>
@@ -23469,7 +23598,7 @@
                                     </p:animClr>
                                     <p:animClr clrSpc="hsl" dir="cw">
                                       <p:cBhvr>
-                                        <p:cTn id="26" dur="500" fill="hold"/>
+                                        <p:cTn id="7" dur="10" fill="hold"/>
                                         <p:tgtEl>
                                           <p:spTgt spid="22"/>
                                         </p:tgtEl>
@@ -23483,7 +23612,7 @@
                                     </p:animClr>
                                     <p:animClr clrSpc="hsl" dir="cw">
                                       <p:cBhvr>
-                                        <p:cTn id="27" dur="500" fill="hold"/>
+                                        <p:cTn id="8" dur="10" fill="hold"/>
                                         <p:tgtEl>
                                           <p:spTgt spid="22"/>
                                         </p:tgtEl>
@@ -23497,7 +23626,7 @@
                                     </p:animClr>
                                     <p:set>
                                       <p:cBhvr>
-                                        <p:cTn id="28" dur="500" fill="hold"/>
+                                        <p:cTn id="9" dur="10" fill="hold"/>
                                         <p:tgtEl>
                                           <p:spTgt spid="22"/>
                                         </p:tgtEl>
@@ -23512,168 +23641,15 @@
                                   </p:childTnLst>
                                 </p:cTn>
                               </p:par>
-                            </p:childTnLst>
-                          </p:cTn>
-                        </p:par>
-                      </p:childTnLst>
-                    </p:cTn>
-                  </p:par>
-                  <p:par>
-                    <p:cTn id="29" fill="hold">
-                      <p:stCondLst>
-                        <p:cond delay="indefinite"/>
-                      </p:stCondLst>
-                      <p:childTnLst>
-                        <p:par>
-                          <p:cTn id="30" fill="hold">
-                            <p:stCondLst>
-                              <p:cond delay="0"/>
-                            </p:stCondLst>
-                            <p:childTnLst>
                               <p:par>
-                                <p:cTn id="31" presetID="10" presetClass="entr" presetSubtype="0" fill="hold" grpId="0" nodeType="clickEffect">
-                                  <p:stCondLst>
-                                    <p:cond delay="0"/>
-                                  </p:stCondLst>
-                                  <p:childTnLst>
-                                    <p:set>
-                                      <p:cBhvr>
-                                        <p:cTn id="32" dur="1" fill="hold">
-                                          <p:stCondLst>
-                                            <p:cond delay="0"/>
-                                          </p:stCondLst>
-                                        </p:cTn>
-                                        <p:tgtEl>
-                                          <p:spTgt spid="28"/>
-                                        </p:tgtEl>
-                                        <p:attrNameLst>
-                                          <p:attrName>style.visibility</p:attrName>
-                                        </p:attrNameLst>
-                                      </p:cBhvr>
-                                      <p:to>
-                                        <p:strVal val="visible"/>
-                                      </p:to>
-                                    </p:set>
-                                    <p:animEffect transition="in" filter="fade">
-                                      <p:cBhvr>
-                                        <p:cTn id="33" dur="500"/>
-                                        <p:tgtEl>
-                                          <p:spTgt spid="28"/>
-                                        </p:tgtEl>
-                                      </p:cBhvr>
-                                    </p:animEffect>
-                                  </p:childTnLst>
-                                </p:cTn>
-                              </p:par>
-                              <p:par>
-                                <p:cTn id="34" presetID="10" presetClass="entr" presetSubtype="0" fill="hold" grpId="0" nodeType="withEffect">
-                                  <p:stCondLst>
-                                    <p:cond delay="0"/>
-                                  </p:stCondLst>
-                                  <p:childTnLst>
-                                    <p:set>
-                                      <p:cBhvr>
-                                        <p:cTn id="35" dur="1" fill="hold">
-                                          <p:stCondLst>
-                                            <p:cond delay="0"/>
-                                          </p:stCondLst>
-                                        </p:cTn>
-                                        <p:tgtEl>
-                                          <p:spTgt spid="29"/>
-                                        </p:tgtEl>
-                                        <p:attrNameLst>
-                                          <p:attrName>style.visibility</p:attrName>
-                                        </p:attrNameLst>
-                                      </p:cBhvr>
-                                      <p:to>
-                                        <p:strVal val="visible"/>
-                                      </p:to>
-                                    </p:set>
-                                    <p:animEffect transition="in" filter="fade">
-                                      <p:cBhvr>
-                                        <p:cTn id="36" dur="500"/>
-                                        <p:tgtEl>
-                                          <p:spTgt spid="29"/>
-                                        </p:tgtEl>
-                                      </p:cBhvr>
-                                    </p:animEffect>
-                                  </p:childTnLst>
-                                </p:cTn>
-                              </p:par>
-                              <p:par>
-                                <p:cTn id="37" presetID="30" presetClass="emph" presetSubtype="0" fill="hold" grpId="1" nodeType="withEffect">
+                                <p:cTn id="10" presetID="30" presetClass="emph" presetSubtype="0" fill="hold" grpId="0" nodeType="withEffect">
                                   <p:stCondLst>
                                     <p:cond delay="0"/>
                                   </p:stCondLst>
                                   <p:childTnLst>
                                     <p:animClr clrSpc="hsl" dir="cw">
                                       <p:cBhvr override="childStyle">
-                                        <p:cTn id="38" dur="500" fill="hold"/>
-                                        <p:tgtEl>
-                                          <p:spTgt spid="24"/>
-                                        </p:tgtEl>
-                                        <p:attrNameLst>
-                                          <p:attrName>style.color</p:attrName>
-                                        </p:attrNameLst>
-                                      </p:cBhvr>
-                                      <p:by>
-                                        <p:hsl h="0" s="12549" l="25098"/>
-                                      </p:by>
-                                    </p:animClr>
-                                    <p:animClr clrSpc="hsl" dir="cw">
-                                      <p:cBhvr>
-                                        <p:cTn id="39" dur="500" fill="hold"/>
-                                        <p:tgtEl>
-                                          <p:spTgt spid="24"/>
-                                        </p:tgtEl>
-                                        <p:attrNameLst>
-                                          <p:attrName>fillcolor</p:attrName>
-                                        </p:attrNameLst>
-                                      </p:cBhvr>
-                                      <p:by>
-                                        <p:hsl h="0" s="12549" l="25098"/>
-                                      </p:by>
-                                    </p:animClr>
-                                    <p:animClr clrSpc="hsl" dir="cw">
-                                      <p:cBhvr>
-                                        <p:cTn id="40" dur="500" fill="hold"/>
-                                        <p:tgtEl>
-                                          <p:spTgt spid="24"/>
-                                        </p:tgtEl>
-                                        <p:attrNameLst>
-                                          <p:attrName>stroke.color</p:attrName>
-                                        </p:attrNameLst>
-                                      </p:cBhvr>
-                                      <p:by>
-                                        <p:hsl h="0" s="12549" l="25098"/>
-                                      </p:by>
-                                    </p:animClr>
-                                    <p:set>
-                                      <p:cBhvr>
-                                        <p:cTn id="41" dur="500" fill="hold"/>
-                                        <p:tgtEl>
-                                          <p:spTgt spid="24"/>
-                                        </p:tgtEl>
-                                        <p:attrNameLst>
-                                          <p:attrName>fill.type</p:attrName>
-                                        </p:attrNameLst>
-                                      </p:cBhvr>
-                                      <p:to>
-                                        <p:strVal val="solid"/>
-                                      </p:to>
-                                    </p:set>
-                                  </p:childTnLst>
-                                </p:cTn>
-                              </p:par>
-                              <p:par>
-                                <p:cTn id="42" presetID="30" presetClass="emph" presetSubtype="0" fill="hold" grpId="1" nodeType="withEffect">
-                                  <p:stCondLst>
-                                    <p:cond delay="0"/>
-                                  </p:stCondLst>
-                                  <p:childTnLst>
-                                    <p:animClr clrSpc="hsl" dir="cw">
-                                      <p:cBhvr override="childStyle">
-                                        <p:cTn id="43" dur="500" fill="hold"/>
+                                        <p:cTn id="11" dur="10" fill="hold"/>
                                         <p:tgtEl>
                                           <p:spTgt spid="25"/>
                                         </p:tgtEl>
@@ -23687,7 +23663,7 @@
                                     </p:animClr>
                                     <p:animClr clrSpc="hsl" dir="cw">
                                       <p:cBhvr>
-                                        <p:cTn id="44" dur="500" fill="hold"/>
+                                        <p:cTn id="12" dur="10" fill="hold"/>
                                         <p:tgtEl>
                                           <p:spTgt spid="25"/>
                                         </p:tgtEl>
@@ -23701,7 +23677,7 @@
                                     </p:animClr>
                                     <p:animClr clrSpc="hsl" dir="cw">
                                       <p:cBhvr>
-                                        <p:cTn id="45" dur="500" fill="hold"/>
+                                        <p:cTn id="13" dur="10" fill="hold"/>
                                         <p:tgtEl>
                                           <p:spTgt spid="25"/>
                                         </p:tgtEl>
@@ -23715,7 +23691,7 @@
                                     </p:animClr>
                                     <p:set>
                                       <p:cBhvr>
-                                        <p:cTn id="46" dur="500" fill="hold"/>
+                                        <p:cTn id="14" dur="10" fill="hold"/>
                                         <p:tgtEl>
                                           <p:spTgt spid="25"/>
                                         </p:tgtEl>
@@ -23730,168 +23706,15 @@
                                   </p:childTnLst>
                                 </p:cTn>
                               </p:par>
-                            </p:childTnLst>
-                          </p:cTn>
-                        </p:par>
-                      </p:childTnLst>
-                    </p:cTn>
-                  </p:par>
-                  <p:par>
-                    <p:cTn id="47" fill="hold">
-                      <p:stCondLst>
-                        <p:cond delay="indefinite"/>
-                      </p:stCondLst>
-                      <p:childTnLst>
-                        <p:par>
-                          <p:cTn id="48" fill="hold">
-                            <p:stCondLst>
-                              <p:cond delay="0"/>
-                            </p:stCondLst>
-                            <p:childTnLst>
                               <p:par>
-                                <p:cTn id="49" presetID="10" presetClass="entr" presetSubtype="0" fill="hold" grpId="0" nodeType="clickEffect">
-                                  <p:stCondLst>
-                                    <p:cond delay="0"/>
-                                  </p:stCondLst>
-                                  <p:childTnLst>
-                                    <p:set>
-                                      <p:cBhvr>
-                                        <p:cTn id="50" dur="1" fill="hold">
-                                          <p:stCondLst>
-                                            <p:cond delay="0"/>
-                                          </p:stCondLst>
-                                        </p:cTn>
-                                        <p:tgtEl>
-                                          <p:spTgt spid="27"/>
-                                        </p:tgtEl>
-                                        <p:attrNameLst>
-                                          <p:attrName>style.visibility</p:attrName>
-                                        </p:attrNameLst>
-                                      </p:cBhvr>
-                                      <p:to>
-                                        <p:strVal val="visible"/>
-                                      </p:to>
-                                    </p:set>
-                                    <p:animEffect transition="in" filter="fade">
-                                      <p:cBhvr>
-                                        <p:cTn id="51" dur="500"/>
-                                        <p:tgtEl>
-                                          <p:spTgt spid="27"/>
-                                        </p:tgtEl>
-                                      </p:cBhvr>
-                                    </p:animEffect>
-                                  </p:childTnLst>
-                                </p:cTn>
-                              </p:par>
-                              <p:par>
-                                <p:cTn id="52" presetID="10" presetClass="entr" presetSubtype="0" fill="hold" grpId="0" nodeType="withEffect">
-                                  <p:stCondLst>
-                                    <p:cond delay="0"/>
-                                  </p:stCondLst>
-                                  <p:childTnLst>
-                                    <p:set>
-                                      <p:cBhvr>
-                                        <p:cTn id="53" dur="1" fill="hold">
-                                          <p:stCondLst>
-                                            <p:cond delay="0"/>
-                                          </p:stCondLst>
-                                        </p:cTn>
-                                        <p:tgtEl>
-                                          <p:spTgt spid="26"/>
-                                        </p:tgtEl>
-                                        <p:attrNameLst>
-                                          <p:attrName>style.visibility</p:attrName>
-                                        </p:attrNameLst>
-                                      </p:cBhvr>
-                                      <p:to>
-                                        <p:strVal val="visible"/>
-                                      </p:to>
-                                    </p:set>
-                                    <p:animEffect transition="in" filter="fade">
-                                      <p:cBhvr>
-                                        <p:cTn id="54" dur="500"/>
-                                        <p:tgtEl>
-                                          <p:spTgt spid="26"/>
-                                        </p:tgtEl>
-                                      </p:cBhvr>
-                                    </p:animEffect>
-                                  </p:childTnLst>
-                                </p:cTn>
-                              </p:par>
-                              <p:par>
-                                <p:cTn id="55" presetID="30" presetClass="emph" presetSubtype="0" fill="hold" grpId="1" nodeType="withEffect">
+                                <p:cTn id="15" presetID="30" presetClass="emph" presetSubtype="0" fill="hold" grpId="0" nodeType="withEffect">
                                   <p:stCondLst>
                                     <p:cond delay="0"/>
                                   </p:stCondLst>
                                   <p:childTnLst>
                                     <p:animClr clrSpc="hsl" dir="cw">
                                       <p:cBhvr override="childStyle">
-                                        <p:cTn id="56" dur="500" fill="hold"/>
-                                        <p:tgtEl>
-                                          <p:spTgt spid="28"/>
-                                        </p:tgtEl>
-                                        <p:attrNameLst>
-                                          <p:attrName>style.color</p:attrName>
-                                        </p:attrNameLst>
-                                      </p:cBhvr>
-                                      <p:by>
-                                        <p:hsl h="0" s="12549" l="25098"/>
-                                      </p:by>
-                                    </p:animClr>
-                                    <p:animClr clrSpc="hsl" dir="cw">
-                                      <p:cBhvr>
-                                        <p:cTn id="57" dur="500" fill="hold"/>
-                                        <p:tgtEl>
-                                          <p:spTgt spid="28"/>
-                                        </p:tgtEl>
-                                        <p:attrNameLst>
-                                          <p:attrName>fillcolor</p:attrName>
-                                        </p:attrNameLst>
-                                      </p:cBhvr>
-                                      <p:by>
-                                        <p:hsl h="0" s="12549" l="25098"/>
-                                      </p:by>
-                                    </p:animClr>
-                                    <p:animClr clrSpc="hsl" dir="cw">
-                                      <p:cBhvr>
-                                        <p:cTn id="58" dur="500" fill="hold"/>
-                                        <p:tgtEl>
-                                          <p:spTgt spid="28"/>
-                                        </p:tgtEl>
-                                        <p:attrNameLst>
-                                          <p:attrName>stroke.color</p:attrName>
-                                        </p:attrNameLst>
-                                      </p:cBhvr>
-                                      <p:by>
-                                        <p:hsl h="0" s="12549" l="25098"/>
-                                      </p:by>
-                                    </p:animClr>
-                                    <p:set>
-                                      <p:cBhvr>
-                                        <p:cTn id="59" dur="500" fill="hold"/>
-                                        <p:tgtEl>
-                                          <p:spTgt spid="28"/>
-                                        </p:tgtEl>
-                                        <p:attrNameLst>
-                                          <p:attrName>fill.type</p:attrName>
-                                        </p:attrNameLst>
-                                      </p:cBhvr>
-                                      <p:to>
-                                        <p:strVal val="solid"/>
-                                      </p:to>
-                                    </p:set>
-                                  </p:childTnLst>
-                                </p:cTn>
-                              </p:par>
-                              <p:par>
-                                <p:cTn id="60" presetID="30" presetClass="emph" presetSubtype="0" fill="hold" grpId="1" nodeType="withEffect">
-                                  <p:stCondLst>
-                                    <p:cond delay="0"/>
-                                  </p:stCondLst>
-                                  <p:childTnLst>
-                                    <p:animClr clrSpc="hsl" dir="cw">
-                                      <p:cBhvr override="childStyle">
-                                        <p:cTn id="61" dur="500" fill="hold"/>
+                                        <p:cTn id="16" dur="10" fill="hold"/>
                                         <p:tgtEl>
                                           <p:spTgt spid="29"/>
                                         </p:tgtEl>
@@ -23905,7 +23728,7 @@
                                     </p:animClr>
                                     <p:animClr clrSpc="hsl" dir="cw">
                                       <p:cBhvr>
-                                        <p:cTn id="62" dur="500" fill="hold"/>
+                                        <p:cTn id="17" dur="10" fill="hold"/>
                                         <p:tgtEl>
                                           <p:spTgt spid="29"/>
                                         </p:tgtEl>
@@ -23919,7 +23742,7 @@
                                     </p:animClr>
                                     <p:animClr clrSpc="hsl" dir="cw">
                                       <p:cBhvr>
-                                        <p:cTn id="63" dur="500" fill="hold"/>
+                                        <p:cTn id="18" dur="10" fill="hold"/>
                                         <p:tgtEl>
                                           <p:spTgt spid="29"/>
                                         </p:tgtEl>
@@ -23933,7 +23756,7 @@
                                     </p:animClr>
                                     <p:set>
                                       <p:cBhvr>
-                                        <p:cTn id="64" dur="500" fill="hold"/>
+                                        <p:cTn id="19" dur="10" fill="hold"/>
                                         <p:tgtEl>
                                           <p:spTgt spid="29"/>
                                         </p:tgtEl>
@@ -23948,105 +23771,17 @@
                                   </p:childTnLst>
                                 </p:cTn>
                               </p:par>
-                            </p:childTnLst>
-                          </p:cTn>
-                        </p:par>
-                      </p:childTnLst>
-                    </p:cTn>
-                  </p:par>
-                  <p:par>
-                    <p:cTn id="65" fill="hold">
-                      <p:stCondLst>
-                        <p:cond delay="indefinite"/>
-                      </p:stCondLst>
-                      <p:childTnLst>
-                        <p:par>
-                          <p:cTn id="66" fill="hold">
-                            <p:stCondLst>
-                              <p:cond delay="0"/>
-                            </p:stCondLst>
-                            <p:childTnLst>
                               <p:par>
-                                <p:cTn id="67" presetID="10" presetClass="entr" presetSubtype="0" fill="hold" grpId="0" nodeType="clickEffect">
-                                  <p:stCondLst>
-                                    <p:cond delay="0"/>
-                                  </p:stCondLst>
-                                  <p:childTnLst>
-                                    <p:set>
-                                      <p:cBhvr>
-                                        <p:cTn id="68" dur="1" fill="hold">
-                                          <p:stCondLst>
-                                            <p:cond delay="0"/>
-                                          </p:stCondLst>
-                                        </p:cTn>
-                                        <p:tgtEl>
-                                          <p:spTgt spid="31"/>
-                                        </p:tgtEl>
-                                        <p:attrNameLst>
-                                          <p:attrName>style.visibility</p:attrName>
-                                        </p:attrNameLst>
-                                      </p:cBhvr>
-                                      <p:to>
-                                        <p:strVal val="visible"/>
-                                      </p:to>
-                                    </p:set>
-                                    <p:animEffect transition="in" filter="fade">
-                                      <p:cBhvr>
-                                        <p:cTn id="69" dur="500"/>
-                                        <p:tgtEl>
-                                          <p:spTgt spid="31"/>
-                                        </p:tgtEl>
-                                      </p:cBhvr>
-                                    </p:animEffect>
-                                  </p:childTnLst>
-                                </p:cTn>
-                              </p:par>
-                              <p:par>
-                                <p:cTn id="70" presetID="10" presetClass="entr" presetSubtype="0" fill="hold" grpId="0" nodeType="withEffect">
-                                  <p:stCondLst>
-                                    <p:cond delay="0"/>
-                                  </p:stCondLst>
-                                  <p:childTnLst>
-                                    <p:set>
-                                      <p:cBhvr>
-                                        <p:cTn id="71" dur="1" fill="hold">
-                                          <p:stCondLst>
-                                            <p:cond delay="0"/>
-                                          </p:stCondLst>
-                                        </p:cTn>
-                                        <p:tgtEl>
-                                          <p:spTgt spid="30"/>
-                                        </p:tgtEl>
-                                        <p:attrNameLst>
-                                          <p:attrName>style.visibility</p:attrName>
-                                        </p:attrNameLst>
-                                      </p:cBhvr>
-                                      <p:to>
-                                        <p:strVal val="visible"/>
-                                      </p:to>
-                                    </p:set>
-                                    <p:animEffect transition="in" filter="fade">
-                                      <p:cBhvr>
-                                        <p:cTn id="72" dur="500"/>
-                                        <p:tgtEl>
-                                          <p:spTgt spid="30"/>
-                                        </p:tgtEl>
-                                      </p:cBhvr>
-                                    </p:animEffect>
-                                  </p:childTnLst>
-                                </p:cTn>
-                              </p:par>
-                              <p:par>
-                                <p:cTn id="73" presetID="30" presetClass="emph" presetSubtype="0" fill="hold" grpId="1" nodeType="withEffect">
+                                <p:cTn id="20" presetID="30" presetClass="emph" presetSubtype="0" fill="hold" grpId="0" nodeType="withEffect">
                                   <p:stCondLst>
                                     <p:cond delay="0"/>
                                   </p:stCondLst>
                                   <p:childTnLst>
                                     <p:animClr clrSpc="hsl" dir="cw">
                                       <p:cBhvr override="childStyle">
-                                        <p:cTn id="74" dur="500" fill="hold"/>
+                                        <p:cTn id="21" dur="10" fill="hold"/>
                                         <p:tgtEl>
-                                          <p:spTgt spid="26"/>
+                                          <p:spTgt spid="27"/>
                                         </p:tgtEl>
                                         <p:attrNameLst>
                                           <p:attrName>style.color</p:attrName>
@@ -24058,9 +23793,9 @@
                                     </p:animClr>
                                     <p:animClr clrSpc="hsl" dir="cw">
                                       <p:cBhvr>
-                                        <p:cTn id="75" dur="500" fill="hold"/>
+                                        <p:cTn id="22" dur="10" fill="hold"/>
                                         <p:tgtEl>
-                                          <p:spTgt spid="26"/>
+                                          <p:spTgt spid="27"/>
                                         </p:tgtEl>
                                         <p:attrNameLst>
                                           <p:attrName>fillcolor</p:attrName>
@@ -24072,9 +23807,9 @@
                                     </p:animClr>
                                     <p:animClr clrSpc="hsl" dir="cw">
                                       <p:cBhvr>
-                                        <p:cTn id="76" dur="500" fill="hold"/>
+                                        <p:cTn id="23" dur="10" fill="hold"/>
                                         <p:tgtEl>
-                                          <p:spTgt spid="26"/>
+                                          <p:spTgt spid="27"/>
                                         </p:tgtEl>
                                         <p:attrNameLst>
                                           <p:attrName>stroke.color</p:attrName>
@@ -24086,9 +23821,9 @@
                                     </p:animClr>
                                     <p:set>
                                       <p:cBhvr>
-                                        <p:cTn id="77" dur="500" fill="hold"/>
+                                        <p:cTn id="24" dur="10" fill="hold"/>
                                         <p:tgtEl>
-                                          <p:spTgt spid="26"/>
+                                          <p:spTgt spid="27"/>
                                         </p:tgtEl>
                                         <p:attrNameLst>
                                           <p:attrName>fill.type</p:attrName>
@@ -24102,14 +23837,14 @@
                                 </p:cTn>
                               </p:par>
                               <p:par>
-                                <p:cTn id="78" presetID="30" presetClass="emph" presetSubtype="0" fill="hold" grpId="1" nodeType="withEffect">
+                                <p:cTn id="25" presetID="30" presetClass="emph" presetSubtype="0" fill="hold" grpId="0" nodeType="withEffect">
                                   <p:stCondLst>
                                     <p:cond delay="0"/>
                                   </p:stCondLst>
                                   <p:childTnLst>
                                     <p:animClr clrSpc="hsl" dir="cw">
                                       <p:cBhvr override="childStyle">
-                                        <p:cTn id="79" dur="500" fill="hold"/>
+                                        <p:cTn id="26" dur="10" fill="hold"/>
                                         <p:tgtEl>
                                           <p:spTgt spid="31"/>
                                         </p:tgtEl>
@@ -24123,7 +23858,7 @@
                                     </p:animClr>
                                     <p:animClr clrSpc="hsl" dir="cw">
                                       <p:cBhvr>
-                                        <p:cTn id="80" dur="500" fill="hold"/>
+                                        <p:cTn id="27" dur="10" fill="hold"/>
                                         <p:tgtEl>
                                           <p:spTgt spid="31"/>
                                         </p:tgtEl>
@@ -24137,7 +23872,7 @@
                                     </p:animClr>
                                     <p:animClr clrSpc="hsl" dir="cw">
                                       <p:cBhvr>
-                                        <p:cTn id="81" dur="500" fill="hold"/>
+                                        <p:cTn id="28" dur="10" fill="hold"/>
                                         <p:tgtEl>
                                           <p:spTgt spid="31"/>
                                         </p:tgtEl>
@@ -24151,74 +23886,9 @@
                                     </p:animClr>
                                     <p:set>
                                       <p:cBhvr>
-                                        <p:cTn id="82" dur="500" fill="hold"/>
+                                        <p:cTn id="29" dur="10" fill="hold"/>
                                         <p:tgtEl>
                                           <p:spTgt spid="31"/>
-                                        </p:tgtEl>
-                                        <p:attrNameLst>
-                                          <p:attrName>fill.type</p:attrName>
-                                        </p:attrNameLst>
-                                      </p:cBhvr>
-                                      <p:to>
-                                        <p:strVal val="solid"/>
-                                      </p:to>
-                                    </p:set>
-                                  </p:childTnLst>
-                                </p:cTn>
-                              </p:par>
-                              <p:par>
-                                <p:cTn id="83" presetID="30" presetClass="emph" presetSubtype="0" fill="hold" grpId="1" nodeType="withEffect">
-                                  <p:stCondLst>
-                                    <p:cond delay="0"/>
-                                  </p:stCondLst>
-                                  <p:childTnLst>
-                                    <p:animClr clrSpc="hsl" dir="cw">
-                                      <p:cBhvr override="childStyle">
-                                        <p:cTn id="84" dur="500" fill="hold"/>
-                                        <p:tgtEl>
-                                          <p:spTgt spid="27"/>
-                                        </p:tgtEl>
-                                        <p:attrNameLst>
-                                          <p:attrName>style.color</p:attrName>
-                                        </p:attrNameLst>
-                                      </p:cBhvr>
-                                      <p:by>
-                                        <p:hsl h="0" s="12549" l="25098"/>
-                                      </p:by>
-                                    </p:animClr>
-                                    <p:animClr clrSpc="hsl" dir="cw">
-                                      <p:cBhvr>
-                                        <p:cTn id="85" dur="500" fill="hold"/>
-                                        <p:tgtEl>
-                                          <p:spTgt spid="27"/>
-                                        </p:tgtEl>
-                                        <p:attrNameLst>
-                                          <p:attrName>fillcolor</p:attrName>
-                                        </p:attrNameLst>
-                                      </p:cBhvr>
-                                      <p:by>
-                                        <p:hsl h="0" s="12549" l="25098"/>
-                                      </p:by>
-                                    </p:animClr>
-                                    <p:animClr clrSpc="hsl" dir="cw">
-                                      <p:cBhvr>
-                                        <p:cTn id="86" dur="500" fill="hold"/>
-                                        <p:tgtEl>
-                                          <p:spTgt spid="27"/>
-                                        </p:tgtEl>
-                                        <p:attrNameLst>
-                                          <p:attrName>stroke.color</p:attrName>
-                                        </p:attrNameLst>
-                                      </p:cBhvr>
-                                      <p:by>
-                                        <p:hsl h="0" s="12549" l="25098"/>
-                                      </p:by>
-                                    </p:animClr>
-                                    <p:set>
-                                      <p:cBhvr>
-                                        <p:cTn id="87" dur="500" fill="hold"/>
-                                        <p:tgtEl>
-                                          <p:spTgt spid="27"/>
                                         </p:tgtEl>
                                         <p:attrNameLst>
                                           <p:attrName>fill.type</p:attrName>
@@ -24259,25 +23929,11 @@
       </p:par>
     </p:tnLst>
     <p:bldLst>
-      <p:bldP spid="18" grpId="0"/>
-      <p:bldP spid="18" grpId="1"/>
       <p:bldP spid="22" grpId="0" animBg="1"/>
-      <p:bldP spid="22" grpId="1" animBg="1"/>
-      <p:bldP spid="24" grpId="0"/>
-      <p:bldP spid="24" grpId="1"/>
       <p:bldP spid="25" grpId="0" animBg="1"/>
-      <p:bldP spid="25" grpId="1" animBg="1"/>
-      <p:bldP spid="26" grpId="0"/>
-      <p:bldP spid="26" grpId="1"/>
       <p:bldP spid="27" grpId="0" animBg="1"/>
-      <p:bldP spid="27" grpId="1" animBg="1"/>
-      <p:bldP spid="28" grpId="0"/>
-      <p:bldP spid="28" grpId="1"/>
       <p:bldP spid="29" grpId="0" animBg="1"/>
-      <p:bldP spid="29" grpId="1" animBg="1"/>
-      <p:bldP spid="30" grpId="0"/>
       <p:bldP spid="31" grpId="0" animBg="1"/>
-      <p:bldP spid="31" grpId="1" animBg="1"/>
     </p:bldLst>
   </p:timing>
 </p:sld>
@@ -24302,7 +23958,7 @@
       </p:grpSpPr>
       <p:sp>
         <p:nvSpPr>
-          <p:cNvPr id="15" name="Rectangle 13"/>
+          <p:cNvPr id="3" name="Rectangle 12"/>
           <p:cNvSpPr>
             <a:spLocks noChangeArrowheads="1"/>
           </p:cNvSpPr>
@@ -24310,8 +23966,8 @@
         </p:nvSpPr>
         <p:spPr bwMode="auto">
           <a:xfrm>
-            <a:off x="533400" y="3830094"/>
-            <a:ext cx="7924800" cy="624663"/>
+            <a:off x="0" y="872105"/>
+            <a:ext cx="9144000" cy="824816"/>
           </a:xfrm>
           <a:prstGeom prst="rect">
             <a:avLst/>
@@ -24354,81 +24010,138 @@
           <a:bodyPr/>
           <a:lstStyle/>
           <a:p>
-            <a:pPr algn="ctr">
-              <a:lnSpc>
-                <a:spcPct val="75000"/>
-              </a:lnSpc>
-            </a:pPr>
-            <a:r>
-              <a:rPr lang="en-GB" b="1" dirty="0">
+            <a:pPr algn="ctr"/>
+            <a:r>
+              <a:rPr lang="en-GB" b="1" dirty="0" smtClean="0">
                 <a:solidFill>
                   <a:srgbClr val="022F94"/>
                 </a:solidFill>
+                <a:effectLst>
+                  <a:outerShdw blurRad="38100" dist="38100" dir="2700000" algn="tl">
+                    <a:srgbClr val="000000">
+                      <a:alpha val="43137"/>
+                    </a:srgbClr>
+                  </a:outerShdw>
+                </a:effectLst>
                 <a:latin typeface="Arial" panose="020B0604020202020204" pitchFamily="34" charset="0"/>
                 <a:cs typeface="Arial" panose="020B0604020202020204" pitchFamily="34" charset="0"/>
               </a:rPr>
-              <a:t>s</a:t>
-            </a:r>
-            <a:r>
-              <a:rPr lang="en-GB" b="1" dirty="0" smtClean="0">
-                <a:solidFill>
-                  <a:srgbClr val="022F94"/>
-                </a:solidFill>
-                <a:latin typeface="Arial" panose="020B0604020202020204" pitchFamily="34" charset="0"/>
-                <a:cs typeface="Arial" panose="020B0604020202020204" pitchFamily="34" charset="0"/>
-              </a:rPr>
-              <a:t>ave the file as </a:t>
-            </a:r>
-            <a:r>
-              <a:rPr lang="en-GB" b="1" i="1" dirty="0" smtClean="0">
-                <a:solidFill>
-                  <a:srgbClr val="022F94"/>
-                </a:solidFill>
-                <a:latin typeface="Arial" panose="020B0604020202020204" pitchFamily="34" charset="0"/>
-                <a:cs typeface="Arial" panose="020B0604020202020204" pitchFamily="34" charset="0"/>
-              </a:rPr>
-              <a:t>exportxl.sas</a:t>
-            </a:r>
-            <a:r>
-              <a:rPr lang="en-GB" b="1" dirty="0" smtClean="0">
-                <a:solidFill>
-                  <a:srgbClr val="022F94"/>
-                </a:solidFill>
-                <a:latin typeface="Arial" panose="020B0604020202020204" pitchFamily="34" charset="0"/>
-                <a:cs typeface="Arial" panose="020B0604020202020204" pitchFamily="34" charset="0"/>
-              </a:rPr>
-              <a:t> in a directory that</a:t>
-            </a:r>
-          </a:p>
-          <a:p>
-            <a:pPr algn="ctr">
-              <a:lnSpc>
-                <a:spcPct val="75000"/>
-              </a:lnSpc>
-            </a:pPr>
-            <a:r>
-              <a:rPr lang="en-GB" b="1" dirty="0" smtClean="0">
-                <a:solidFill>
-                  <a:srgbClr val="022F94"/>
-                </a:solidFill>
-                <a:latin typeface="Arial" panose="020B0604020202020204" pitchFamily="34" charset="0"/>
-                <a:cs typeface="Arial" panose="020B0604020202020204" pitchFamily="34" charset="0"/>
-              </a:rPr>
-              <a:t>exists in your SASAUTOS* path  </a:t>
-            </a:r>
-            <a:endParaRPr lang="en-GB" b="1" dirty="0">
+              <a:t>From the internet, of course!:</a:t>
+            </a:r>
+          </a:p>
+          <a:p>
+            <a:pPr algn="ctr"/>
+            <a:endParaRPr lang="en-GB" sz="800" b="1" dirty="0" smtClean="0">
               <a:solidFill>
                 <a:srgbClr val="022F94"/>
               </a:solidFill>
+              <a:effectLst>
+                <a:outerShdw blurRad="38100" dist="38100" dir="2700000" algn="tl">
+                  <a:srgbClr val="000000">
+                    <a:alpha val="43137"/>
+                  </a:srgbClr>
+                </a:outerShdw>
+              </a:effectLst>
               <a:latin typeface="Arial" panose="020B0604020202020204" pitchFamily="34" charset="0"/>
               <a:cs typeface="Arial" panose="020B0604020202020204" pitchFamily="34" charset="0"/>
             </a:endParaRPr>
           </a:p>
+          <a:p>
+            <a:pPr algn="ctr"/>
+            <a:r>
+              <a:rPr lang="en-GB" sz="1600" b="1" dirty="0" smtClean="0">
+                <a:solidFill>
+                  <a:srgbClr val="022F94"/>
+                </a:solidFill>
+                <a:effectLst>
+                  <a:outerShdw blurRad="38100" dist="38100" dir="2700000" algn="tl">
+                    <a:srgbClr val="000000">
+                      <a:alpha val="43137"/>
+                    </a:srgbClr>
+                  </a:outerShdw>
+                </a:effectLst>
+                <a:latin typeface="Arial" panose="020B0604020202020204" pitchFamily="34" charset="0"/>
+                <a:cs typeface="Arial" panose="020B0604020202020204" pitchFamily="34" charset="0"/>
+              </a:rPr>
+              <a:t>https</a:t>
+            </a:r>
+            <a:r>
+              <a:rPr lang="en-GB" sz="1600" b="1" dirty="0">
+                <a:solidFill>
+                  <a:srgbClr val="022F94"/>
+                </a:solidFill>
+                <a:effectLst>
+                  <a:outerShdw blurRad="38100" dist="38100" dir="2700000" algn="tl">
+                    <a:srgbClr val="000000">
+                      <a:alpha val="43137"/>
+                    </a:srgbClr>
+                  </a:outerShdw>
+                </a:effectLst>
+                <a:latin typeface="Arial" panose="020B0604020202020204" pitchFamily="34" charset="0"/>
+                <a:cs typeface="Arial" panose="020B0604020202020204" pitchFamily="34" charset="0"/>
+              </a:rPr>
+              <a:t>://github.com/FriedEgg/Papers/tree/master/Excelling_to_Another_Level_with_SAS/doc</a:t>
+            </a:r>
+          </a:p>
         </p:txBody>
       </p:sp>
+      <p:pic>
+        <p:nvPicPr>
+          <p:cNvPr id="2" name="Picture 2"/>
+          <p:cNvPicPr>
+            <a:picLocks noChangeAspect="1" noChangeArrowheads="1"/>
+          </p:cNvPicPr>
+          <p:nvPr/>
+        </p:nvPicPr>
+        <p:blipFill>
+          <a:blip r:embed="rId2">
+            <a:extLst>
+              <a:ext uri="{28A0092B-C50C-407E-A947-70E740481C1C}">
+                <a14:useLocalDpi xmlns:a14="http://schemas.microsoft.com/office/drawing/2010/main" val="0"/>
+              </a:ext>
+            </a:extLst>
+          </a:blip>
+          <a:srcRect/>
+          <a:stretch>
+            <a:fillRect/>
+          </a:stretch>
+        </p:blipFill>
+        <p:spPr bwMode="auto">
+          <a:xfrm>
+            <a:off x="3620228" y="1679985"/>
+            <a:ext cx="1702059" cy="1696270"/>
+          </a:xfrm>
+          <a:prstGeom prst="rect">
+            <a:avLst/>
+          </a:prstGeom>
+          <a:noFill/>
+          <a:ln>
+            <a:noFill/>
+          </a:ln>
+          <a:extLst>
+            <a:ext uri="{909E8E84-426E-40DD-AFC4-6F175D3DCCD1}">
+              <a14:hiddenFill xmlns:a14="http://schemas.microsoft.com/office/drawing/2010/main">
+                <a:solidFill>
+                  <a:schemeClr val="accent1"/>
+                </a:solidFill>
+              </a14:hiddenFill>
+            </a:ext>
+            <a:ext uri="{91240B29-F687-4F45-9708-019B960494DF}">
+              <a14:hiddenLine xmlns:a14="http://schemas.microsoft.com/office/drawing/2010/main" w="9525">
+                <a:solidFill>
+                  <a:schemeClr val="tx1"/>
+                </a:solidFill>
+                <a:miter lim="800000"/>
+                <a:headEnd/>
+                <a:tailEnd/>
+              </a14:hiddenLine>
+            </a:ext>
+          </a:extLst>
+        </p:spPr>
+      </p:pic>
       <p:sp>
         <p:nvSpPr>
-          <p:cNvPr id="20" name="Rectangle 13"/>
+          <p:cNvPr id="7" name="Rectangle 12"/>
           <p:cNvSpPr>
             <a:spLocks noChangeArrowheads="1"/>
           </p:cNvSpPr>
@@ -24436,8 +24149,8 @@
         </p:nvSpPr>
         <p:spPr bwMode="auto">
           <a:xfrm>
-            <a:off x="308344" y="4311882"/>
-            <a:ext cx="8484782" cy="285750"/>
+            <a:off x="2936" y="3354384"/>
+            <a:ext cx="9144000" cy="452697"/>
           </a:xfrm>
           <a:prstGeom prst="rect">
             <a:avLst/>
@@ -24480,31 +24193,109 @@
           <a:bodyPr/>
           <a:lstStyle/>
           <a:p>
-            <a:pPr algn="ctr">
-              <a:lnSpc>
-                <a:spcPct val="75000"/>
-              </a:lnSpc>
-            </a:pPr>
+            <a:pPr algn="ctr"/>
             <a:r>
               <a:rPr lang="en-GB" b="1" dirty="0" smtClean="0">
                 <a:solidFill>
-                  <a:srgbClr val="1D83FF"/>
-                </a:solidFill>
+                  <a:srgbClr val="022F94"/>
+                </a:solidFill>
+                <a:effectLst>
+                  <a:outerShdw blurRad="38100" dist="38100" dir="2700000" algn="tl">
+                    <a:srgbClr val="000000">
+                      <a:alpha val="43137"/>
+                    </a:srgbClr>
+                  </a:outerShdw>
+                </a:effectLst>
                 <a:latin typeface="Arial" panose="020B0604020202020204" pitchFamily="34" charset="0"/>
                 <a:cs typeface="Arial" panose="020B0604020202020204" pitchFamily="34" charset="0"/>
               </a:rPr>
-              <a:t>* see: </a:t>
-            </a:r>
-            <a:r>
-              <a:rPr lang="en-CA" b="1" dirty="0">
+              <a:t>The page includes the paper, this powerpoint, the macro, and a tip sheet </a:t>
+            </a:r>
+            <a:endParaRPr lang="en-GB" sz="1600" b="1" dirty="0">
+              <a:solidFill>
+                <a:srgbClr val="022F94"/>
+              </a:solidFill>
+              <a:effectLst>
+                <a:outerShdw blurRad="38100" dist="38100" dir="2700000" algn="tl">
+                  <a:srgbClr val="000000">
+                    <a:alpha val="43137"/>
+                  </a:srgbClr>
+                </a:outerShdw>
+              </a:effectLst>
+              <a:latin typeface="Arial" panose="020B0604020202020204" pitchFamily="34" charset="0"/>
+              <a:cs typeface="Arial" panose="020B0604020202020204" pitchFamily="34" charset="0"/>
+            </a:endParaRPr>
+          </a:p>
+        </p:txBody>
+      </p:sp>
+      <p:sp>
+        <p:nvSpPr>
+          <p:cNvPr id="8" name="Rectangle 13"/>
+          <p:cNvSpPr>
+            <a:spLocks noChangeArrowheads="1"/>
+          </p:cNvSpPr>
+          <p:nvPr/>
+        </p:nvSpPr>
+        <p:spPr bwMode="auto">
+          <a:xfrm>
+            <a:off x="533400" y="3918015"/>
+            <a:ext cx="7924800" cy="481788"/>
+          </a:xfrm>
+          <a:prstGeom prst="rect">
+            <a:avLst/>
+          </a:prstGeom>
+          <a:noFill/>
+          <a:ln>
+            <a:noFill/>
+          </a:ln>
+          <a:effectLst/>
+          <a:extLst>
+            <a:ext uri="{909E8E84-426E-40DD-AFC4-6F175D3DCCD1}">
+              <a14:hiddenFill xmlns:a14="http://schemas.microsoft.com/office/drawing/2010/main">
+                <a:solidFill>
+                  <a:schemeClr val="accent1"/>
+                </a:solidFill>
+              </a14:hiddenFill>
+            </a:ext>
+            <a:ext uri="{91240B29-F687-4F45-9708-019B960494DF}">
+              <a14:hiddenLine xmlns:a14="http://schemas.microsoft.com/office/drawing/2010/main" w="9525">
+                <a:solidFill>
+                  <a:schemeClr val="tx1"/>
+                </a:solidFill>
+                <a:miter lim="800000"/>
+                <a:headEnd/>
+                <a:tailEnd/>
+              </a14:hiddenLine>
+            </a:ext>
+            <a:ext uri="{AF507438-7753-43E0-B8FC-AC1667EBCBE1}">
+              <a14:hiddenEffects xmlns:a14="http://schemas.microsoft.com/office/drawing/2010/main">
+                <a:effectLst>
+                  <a:outerShdw dist="35921" dir="2700000" algn="ctr" rotWithShape="0">
+                    <a:schemeClr val="bg2"/>
+                  </a:outerShdw>
+                </a:effectLst>
+              </a14:hiddenEffects>
+            </a:ext>
+          </a:extLst>
+        </p:spPr>
+        <p:txBody>
+          <a:bodyPr/>
+          <a:lstStyle/>
+          <a:p>
+            <a:pPr algn="ctr">
+              <a:lnSpc>
+                <a:spcPct val="75000"/>
+              </a:lnSpc>
+            </a:pPr>
+            <a:r>
+              <a:rPr lang="en-GB" b="1" dirty="0">
                 <a:solidFill>
                   <a:srgbClr val="022F94"/>
                 </a:solidFill>
                 <a:latin typeface="Arial" panose="020B0604020202020204" pitchFamily="34" charset="0"/>
                 <a:cs typeface="Arial" panose="020B0604020202020204" pitchFamily="34" charset="0"/>
-                <a:hlinkClick r:id="rId2"/>
-              </a:rPr>
-              <a:t>http://analytics.ncsu.edu/sesug/2008/SBC-126.pdf</a:t>
+              </a:rPr>
+              <a:t>s</a:t>
             </a:r>
             <a:r>
               <a:rPr lang="en-GB" b="1" dirty="0" smtClean="0">
@@ -24514,7 +24305,44 @@
                 <a:latin typeface="Arial" panose="020B0604020202020204" pitchFamily="34" charset="0"/>
                 <a:cs typeface="Arial" panose="020B0604020202020204" pitchFamily="34" charset="0"/>
               </a:rPr>
-              <a:t>  </a:t>
+              <a:t>ave the file as </a:t>
+            </a:r>
+            <a:r>
+              <a:rPr lang="en-GB" b="1" i="1" dirty="0" smtClean="0">
+                <a:solidFill>
+                  <a:srgbClr val="022F94"/>
+                </a:solidFill>
+                <a:latin typeface="Arial" panose="020B0604020202020204" pitchFamily="34" charset="0"/>
+                <a:cs typeface="Arial" panose="020B0604020202020204" pitchFamily="34" charset="0"/>
+              </a:rPr>
+              <a:t>exportxl.sas</a:t>
+            </a:r>
+            <a:r>
+              <a:rPr lang="en-GB" b="1" dirty="0" smtClean="0">
+                <a:solidFill>
+                  <a:srgbClr val="022F94"/>
+                </a:solidFill>
+                <a:latin typeface="Arial" panose="020B0604020202020204" pitchFamily="34" charset="0"/>
+                <a:cs typeface="Arial" panose="020B0604020202020204" pitchFamily="34" charset="0"/>
+              </a:rPr>
+              <a:t> in a directory that</a:t>
+            </a:r>
+          </a:p>
+          <a:p>
+            <a:pPr algn="ctr">
+              <a:lnSpc>
+                <a:spcPct val="75000"/>
+              </a:lnSpc>
+            </a:pPr>
+            <a:r>
+              <a:rPr lang="en-GB" b="1" dirty="0" smtClean="0">
+                <a:solidFill>
+                  <a:srgbClr val="022F94"/>
+                </a:solidFill>
+                <a:latin typeface="Arial" panose="020B0604020202020204" pitchFamily="34" charset="0"/>
+                <a:cs typeface="Arial" panose="020B0604020202020204" pitchFamily="34" charset="0"/>
+              </a:rPr>
+              <a:t>exists in your SASAUTOS* path  </a:t>
             </a:r>
             <a:endParaRPr lang="en-GB" b="1" dirty="0">
               <a:solidFill>
@@ -24528,7 +24356,107 @@
       </p:sp>
       <p:sp>
         <p:nvSpPr>
-          <p:cNvPr id="6" name="Title 1"/>
+          <p:cNvPr id="9" name="Rectangle 13"/>
+          <p:cNvSpPr>
+            <a:spLocks noChangeArrowheads="1"/>
+          </p:cNvSpPr>
+          <p:nvPr/>
+        </p:nvSpPr>
+        <p:spPr bwMode="auto">
+          <a:xfrm>
+            <a:off x="308344" y="4399802"/>
+            <a:ext cx="8484782" cy="285750"/>
+          </a:xfrm>
+          <a:prstGeom prst="rect">
+            <a:avLst/>
+          </a:prstGeom>
+          <a:noFill/>
+          <a:ln>
+            <a:noFill/>
+          </a:ln>
+          <a:effectLst/>
+          <a:extLst>
+            <a:ext uri="{909E8E84-426E-40DD-AFC4-6F175D3DCCD1}">
+              <a14:hiddenFill xmlns:a14="http://schemas.microsoft.com/office/drawing/2010/main">
+                <a:solidFill>
+                  <a:schemeClr val="accent1"/>
+                </a:solidFill>
+              </a14:hiddenFill>
+            </a:ext>
+            <a:ext uri="{91240B29-F687-4F45-9708-019B960494DF}">
+              <a14:hiddenLine xmlns:a14="http://schemas.microsoft.com/office/drawing/2010/main" w="9525">
+                <a:solidFill>
+                  <a:schemeClr val="tx1"/>
+                </a:solidFill>
+                <a:miter lim="800000"/>
+                <a:headEnd/>
+                <a:tailEnd/>
+              </a14:hiddenLine>
+            </a:ext>
+            <a:ext uri="{AF507438-7753-43E0-B8FC-AC1667EBCBE1}">
+              <a14:hiddenEffects xmlns:a14="http://schemas.microsoft.com/office/drawing/2010/main">
+                <a:effectLst>
+                  <a:outerShdw dist="35921" dir="2700000" algn="ctr" rotWithShape="0">
+                    <a:schemeClr val="bg2"/>
+                  </a:outerShdw>
+                </a:effectLst>
+              </a14:hiddenEffects>
+            </a:ext>
+          </a:extLst>
+        </p:spPr>
+        <p:txBody>
+          <a:bodyPr/>
+          <a:lstStyle/>
+          <a:p>
+            <a:pPr algn="ctr">
+              <a:lnSpc>
+                <a:spcPct val="75000"/>
+              </a:lnSpc>
+            </a:pPr>
+            <a:r>
+              <a:rPr lang="en-GB" b="1" dirty="0" smtClean="0">
+                <a:solidFill>
+                  <a:srgbClr val="1D83FF"/>
+                </a:solidFill>
+                <a:latin typeface="Arial" panose="020B0604020202020204" pitchFamily="34" charset="0"/>
+                <a:cs typeface="Arial" panose="020B0604020202020204" pitchFamily="34" charset="0"/>
+              </a:rPr>
+              <a:t>* see: </a:t>
+            </a:r>
+            <a:r>
+              <a:rPr lang="en-CA" b="1" dirty="0">
+                <a:solidFill>
+                  <a:srgbClr val="022F94"/>
+                </a:solidFill>
+                <a:latin typeface="Arial" panose="020B0604020202020204" pitchFamily="34" charset="0"/>
+                <a:cs typeface="Arial" panose="020B0604020202020204" pitchFamily="34" charset="0"/>
+                <a:hlinkClick r:id="rId3"/>
+              </a:rPr>
+              <a:t>http://analytics.ncsu.edu/sesug/2008/SBC-126.pdf</a:t>
+            </a:r>
+            <a:r>
+              <a:rPr lang="en-GB" b="1" dirty="0" smtClean="0">
+                <a:solidFill>
+                  <a:srgbClr val="022F94"/>
+                </a:solidFill>
+                <a:latin typeface="Arial" panose="020B0604020202020204" pitchFamily="34" charset="0"/>
+                <a:cs typeface="Arial" panose="020B0604020202020204" pitchFamily="34" charset="0"/>
+              </a:rPr>
+              <a:t>  </a:t>
+            </a:r>
+            <a:endParaRPr lang="en-GB" b="1" dirty="0">
+              <a:solidFill>
+                <a:srgbClr val="022F94"/>
+              </a:solidFill>
+              <a:latin typeface="Arial" panose="020B0604020202020204" pitchFamily="34" charset="0"/>
+              <a:cs typeface="Arial" panose="020B0604020202020204" pitchFamily="34" charset="0"/>
+            </a:endParaRPr>
+          </a:p>
+        </p:txBody>
+      </p:sp>
+      <p:sp>
+        <p:nvSpPr>
+          <p:cNvPr id="10" name="Title 1"/>
           <p:cNvSpPr txBox="1">
             <a:spLocks/>
           </p:cNvSpPr>
@@ -24744,7 +24672,7 @@
                   <a:srgbClr val="F58220"/>
                 </a:solidFill>
               </a:rPr>
-              <a:t>where to get the macro</a:t>
+              <a:t>Where Do I Get It?</a:t>
             </a:r>
             <a:endParaRPr lang="en-CA" kern="0" dirty="0">
               <a:solidFill>
@@ -24756,7 +24684,7 @@
       </p:sp>
       <p:cxnSp>
         <p:nvCxnSpPr>
-          <p:cNvPr id="7" name="Straight Connector 6"/>
+          <p:cNvPr id="11" name="Straight Connector 10"/>
           <p:cNvCxnSpPr/>
           <p:nvPr/>
         </p:nvCxnSpPr>
@@ -24783,273 +24711,10 @@
           <a:effectLst/>
         </p:spPr>
       </p:cxnSp>
-      <p:sp>
-        <p:nvSpPr>
-          <p:cNvPr id="8" name="Rectangle 13"/>
-          <p:cNvSpPr>
-            <a:spLocks noChangeArrowheads="1"/>
-          </p:cNvSpPr>
-          <p:nvPr/>
-        </p:nvSpPr>
-        <p:spPr bwMode="auto">
-          <a:xfrm>
-            <a:off x="0" y="727306"/>
-            <a:ext cx="9144000" cy="1110438"/>
-          </a:xfrm>
-          <a:prstGeom prst="rect">
-            <a:avLst/>
-          </a:prstGeom>
-          <a:noFill/>
-          <a:ln>
-            <a:noFill/>
-          </a:ln>
-          <a:effectLst/>
-          <a:extLst>
-            <a:ext uri="{909E8E84-426E-40DD-AFC4-6F175D3DCCD1}">
-              <a14:hiddenFill xmlns:a14="http://schemas.microsoft.com/office/drawing/2010/main">
-                <a:solidFill>
-                  <a:schemeClr val="accent1"/>
-                </a:solidFill>
-              </a14:hiddenFill>
-            </a:ext>
-            <a:ext uri="{91240B29-F687-4F45-9708-019B960494DF}">
-              <a14:hiddenLine xmlns:a14="http://schemas.microsoft.com/office/drawing/2010/main" w="9525">
-                <a:solidFill>
-                  <a:schemeClr val="tx1"/>
-                </a:solidFill>
-                <a:miter lim="800000"/>
-                <a:headEnd/>
-                <a:tailEnd/>
-              </a14:hiddenLine>
-            </a:ext>
-            <a:ext uri="{AF507438-7753-43E0-B8FC-AC1667EBCBE1}">
-              <a14:hiddenEffects xmlns:a14="http://schemas.microsoft.com/office/drawing/2010/main">
-                <a:effectLst>
-                  <a:outerShdw dist="35921" dir="2700000" algn="ctr" rotWithShape="0">
-                    <a:schemeClr val="bg2"/>
-                  </a:outerShdw>
-                </a:effectLst>
-              </a14:hiddenEffects>
-            </a:ext>
-          </a:extLst>
-        </p:spPr>
-        <p:txBody>
-          <a:bodyPr/>
-          <a:lstStyle/>
-          <a:p>
-            <a:pPr algn="ctr">
-              <a:lnSpc>
-                <a:spcPct val="75000"/>
-              </a:lnSpc>
-            </a:pPr>
-            <a:r>
-              <a:rPr lang="en-GB" sz="2400" b="1" dirty="0" smtClean="0">
-                <a:solidFill>
-                  <a:srgbClr val="022F94"/>
-                </a:solidFill>
-                <a:latin typeface="Arial" panose="020B0604020202020204" pitchFamily="34" charset="0"/>
-                <a:cs typeface="Arial" panose="020B0604020202020204" pitchFamily="34" charset="0"/>
-              </a:rPr>
-              <a:t>Copy the SAS code from:</a:t>
-            </a:r>
-          </a:p>
-          <a:p>
-            <a:pPr algn="ctr"/>
-            <a:r>
-              <a:rPr lang="en-GB" sz="1600" b="1" dirty="0">
-                <a:solidFill>
-                  <a:srgbClr val="022F94"/>
-                </a:solidFill>
-                <a:effectLst>
-                  <a:outerShdw blurRad="38100" dist="38100" dir="2700000" algn="tl">
-                    <a:srgbClr val="000000">
-                      <a:alpha val="43137"/>
-                    </a:srgbClr>
-                  </a:outerShdw>
-                </a:effectLst>
-                <a:latin typeface="Arial" panose="020B0604020202020204" pitchFamily="34" charset="0"/>
-                <a:cs typeface="Arial" panose="020B0604020202020204" pitchFamily="34" charset="0"/>
-                <a:hlinkClick r:id="rId3"/>
-              </a:rPr>
-              <a:t>https://</a:t>
-            </a:r>
-            <a:r>
-              <a:rPr lang="en-GB" sz="1600" b="1" dirty="0" smtClean="0">
-                <a:solidFill>
-                  <a:srgbClr val="022F94"/>
-                </a:solidFill>
-                <a:effectLst>
-                  <a:outerShdw blurRad="38100" dist="38100" dir="2700000" algn="tl">
-                    <a:srgbClr val="000000">
-                      <a:alpha val="43137"/>
-                    </a:srgbClr>
-                  </a:outerShdw>
-                </a:effectLst>
-                <a:latin typeface="Arial" panose="020B0604020202020204" pitchFamily="34" charset="0"/>
-                <a:cs typeface="Arial" panose="020B0604020202020204" pitchFamily="34" charset="0"/>
-                <a:hlinkClick r:id="rId3"/>
-              </a:rPr>
-              <a:t>github.com/FriedEgg/Papers/tree/master/Excelling_to_Another_Level_with_SAS</a:t>
-            </a:r>
-            <a:endParaRPr lang="en-GB" sz="1600" b="1" dirty="0" smtClean="0">
-              <a:solidFill>
-                <a:srgbClr val="022F94"/>
-              </a:solidFill>
-              <a:effectLst>
-                <a:outerShdw blurRad="38100" dist="38100" dir="2700000" algn="tl">
-                  <a:srgbClr val="000000">
-                    <a:alpha val="43137"/>
-                  </a:srgbClr>
-                </a:outerShdw>
-              </a:effectLst>
-              <a:latin typeface="Arial" panose="020B0604020202020204" pitchFamily="34" charset="0"/>
-              <a:cs typeface="Arial" panose="020B0604020202020204" pitchFamily="34" charset="0"/>
-            </a:endParaRPr>
-          </a:p>
-          <a:p>
-            <a:pPr algn="ctr"/>
-            <a:r>
-              <a:rPr lang="en-GB" sz="1600" b="1" dirty="0" smtClean="0">
-                <a:solidFill>
-                  <a:srgbClr val="022F94"/>
-                </a:solidFill>
-                <a:effectLst>
-                  <a:outerShdw blurRad="38100" dist="38100" dir="2700000" algn="tl">
-                    <a:srgbClr val="000000">
-                      <a:alpha val="43137"/>
-                    </a:srgbClr>
-                  </a:outerShdw>
-                </a:effectLst>
-                <a:latin typeface="Arial" panose="020B0604020202020204" pitchFamily="34" charset="0"/>
-                <a:cs typeface="Arial" panose="020B0604020202020204" pitchFamily="34" charset="0"/>
-              </a:rPr>
-              <a:t>or </a:t>
-            </a:r>
-          </a:p>
-          <a:p>
-            <a:pPr algn="ctr"/>
-            <a:r>
-              <a:rPr lang="en-GB" sz="1600" b="1" dirty="0" smtClean="0">
-                <a:solidFill>
-                  <a:srgbClr val="022F94"/>
-                </a:solidFill>
-                <a:effectLst>
-                  <a:outerShdw blurRad="38100" dist="38100" dir="2700000" algn="tl">
-                    <a:srgbClr val="000000">
-                      <a:alpha val="43137"/>
-                    </a:srgbClr>
-                  </a:outerShdw>
-                </a:effectLst>
-                <a:latin typeface="Arial" panose="020B0604020202020204" pitchFamily="34" charset="0"/>
-                <a:cs typeface="Arial" panose="020B0604020202020204" pitchFamily="34" charset="0"/>
-                <a:hlinkClick r:id="rId4"/>
-              </a:rPr>
-              <a:t>https</a:t>
-            </a:r>
-            <a:r>
-              <a:rPr lang="en-GB" sz="1600" b="1" dirty="0">
-                <a:solidFill>
-                  <a:srgbClr val="022F94"/>
-                </a:solidFill>
-                <a:effectLst>
-                  <a:outerShdw blurRad="38100" dist="38100" dir="2700000" algn="tl">
-                    <a:srgbClr val="000000">
-                      <a:alpha val="43137"/>
-                    </a:srgbClr>
-                  </a:outerShdw>
-                </a:effectLst>
-                <a:latin typeface="Arial" panose="020B0604020202020204" pitchFamily="34" charset="0"/>
-                <a:cs typeface="Arial" panose="020B0604020202020204" pitchFamily="34" charset="0"/>
-                <a:hlinkClick r:id="rId4"/>
-              </a:rPr>
-              <a:t>://</a:t>
-            </a:r>
-            <a:r>
-              <a:rPr lang="en-GB" sz="1600" b="1" dirty="0" smtClean="0">
-                <a:solidFill>
-                  <a:srgbClr val="022F94"/>
-                </a:solidFill>
-                <a:effectLst>
-                  <a:outerShdw blurRad="38100" dist="38100" dir="2700000" algn="tl">
-                    <a:srgbClr val="000000">
-                      <a:alpha val="43137"/>
-                    </a:srgbClr>
-                  </a:outerShdw>
-                </a:effectLst>
-                <a:latin typeface="Arial" panose="020B0604020202020204" pitchFamily="34" charset="0"/>
-                <a:cs typeface="Arial" panose="020B0604020202020204" pitchFamily="34" charset="0"/>
-                <a:hlinkClick r:id="rId4"/>
-              </a:rPr>
-              <a:t>goo.gl/YGYXoV</a:t>
-            </a:r>
-            <a:r>
-              <a:rPr lang="en-GB" sz="1600" b="1" dirty="0" smtClean="0">
-                <a:solidFill>
-                  <a:srgbClr val="022F94"/>
-                </a:solidFill>
-                <a:effectLst>
-                  <a:outerShdw blurRad="38100" dist="38100" dir="2700000" algn="tl">
-                    <a:srgbClr val="000000">
-                      <a:alpha val="43137"/>
-                    </a:srgbClr>
-                  </a:outerShdw>
-                </a:effectLst>
-                <a:latin typeface="Arial" panose="020B0604020202020204" pitchFamily="34" charset="0"/>
-                <a:cs typeface="Arial" panose="020B0604020202020204" pitchFamily="34" charset="0"/>
-              </a:rPr>
-              <a:t> </a:t>
-            </a:r>
-            <a:endParaRPr lang="en-GB" sz="1600" b="1" dirty="0">
-              <a:solidFill>
-                <a:srgbClr val="022F94"/>
-              </a:solidFill>
-              <a:effectLst>
-                <a:outerShdw blurRad="38100" dist="38100" dir="2700000" algn="tl">
-                  <a:srgbClr val="000000">
-                    <a:alpha val="43137"/>
-                  </a:srgbClr>
-                </a:outerShdw>
-              </a:effectLst>
-              <a:latin typeface="Arial" panose="020B0604020202020204" pitchFamily="34" charset="0"/>
-              <a:cs typeface="Arial" panose="020B0604020202020204" pitchFamily="34" charset="0"/>
-            </a:endParaRPr>
-          </a:p>
-        </p:txBody>
-      </p:sp>
-      <p:pic>
-        <p:nvPicPr>
-          <p:cNvPr id="2" name="Picture 1"/>
-          <p:cNvPicPr>
-            <a:picLocks noChangeAspect="1"/>
-          </p:cNvPicPr>
-          <p:nvPr/>
-        </p:nvPicPr>
-        <p:blipFill>
-          <a:blip r:embed="rId5">
-            <a:extLst>
-              <a:ext uri="{28A0092B-C50C-407E-A947-70E740481C1C}">
-                <a14:useLocalDpi xmlns:a14="http://schemas.microsoft.com/office/drawing/2010/main" val="0"/>
-              </a:ext>
-            </a:extLst>
-          </a:blip>
-          <a:stretch>
-            <a:fillRect/>
-          </a:stretch>
-        </p:blipFill>
-        <p:spPr>
-          <a:xfrm>
-            <a:off x="3598235" y="1837744"/>
-            <a:ext cx="1905000" cy="1905000"/>
-          </a:xfrm>
-          <a:prstGeom prst="rect">
-            <a:avLst/>
-          </a:prstGeom>
-        </p:spPr>
-      </p:pic>
     </p:spTree>
     <p:extLst>
       <p:ext uri="{BB962C8B-B14F-4D97-AF65-F5344CB8AC3E}">
-        <p14:creationId xmlns:p14="http://schemas.microsoft.com/office/powerpoint/2010/main" val="37955461"/>
+        <p14:creationId xmlns:p14="http://schemas.microsoft.com/office/powerpoint/2010/main" val="3246681828"/>
       </p:ext>
     </p:extLst>
   </p:cSld>
@@ -25058,8 +24723,8 @@
   </p:clrMapOvr>
   <mc:AlternateContent xmlns:mc="http://schemas.openxmlformats.org/markup-compatibility/2006" xmlns:p14="http://schemas.microsoft.com/office/powerpoint/2010/main">
     <mc:Choice Requires="p14">
-      <p:transition spd="slow" p14:dur="1200">
-        <p14:prism/>
+      <p:transition spd="slow" p14:dur="1400">
+        <p14:ripple/>
       </p:transition>
     </mc:Choice>
     <mc:Fallback xmlns="">
@@ -26711,43 +26376,7 @@
                 <a:ea typeface="ＭＳ Ｐゴシック" pitchFamily="34" charset="-128"/>
                 <a:cs typeface="Arial" charset="0"/>
               </a:rPr>
-              <a:t>NORC </a:t>
-            </a:r>
-            <a:r>
-              <a:rPr lang="en-US" sz="2000" b="1" dirty="0" smtClean="0">
-                <a:solidFill>
-                  <a:srgbClr val="0235A6"/>
-                </a:solidFill>
-                <a:effectLst>
-                  <a:outerShdw blurRad="38100" dist="38100" dir="2700000" algn="tl">
-                    <a:srgbClr val="000000">
-                      <a:alpha val="43137"/>
-                    </a:srgbClr>
-                  </a:outerShdw>
-                </a:effectLst>
-                <a:latin typeface="Arial" charset="0"/>
-                <a:ea typeface="ＭＳ Ｐゴシック" pitchFamily="34" charset="-128"/>
-                <a:cs typeface="Arial" charset="0"/>
-              </a:rPr>
-              <a:t>at </a:t>
-            </a:r>
-            <a:r>
-              <a:rPr lang="en-US" sz="2000" b="1" dirty="0" smtClean="0">
-                <a:solidFill>
-                  <a:srgbClr val="0235A6"/>
-                </a:solidFill>
-                <a:effectLst>
-                  <a:outerShdw blurRad="38100" dist="38100" dir="2700000" algn="tl">
-                    <a:srgbClr val="000000">
-                      <a:alpha val="43137"/>
-                    </a:srgbClr>
-                  </a:outerShdw>
-                </a:effectLst>
-                <a:latin typeface="Arial" charset="0"/>
-                <a:ea typeface="ＭＳ Ｐゴシック" pitchFamily="34" charset="-128"/>
-                <a:cs typeface="Arial" charset="0"/>
-              </a:rPr>
-              <a:t>the University of Chicago</a:t>
+              <a:t>NORC at the University of Chicago</a:t>
             </a:r>
           </a:p>
           <a:p>
@@ -26851,6 +26480,240 @@
     <mc:Fallback xmlns="">
       <p:transition spd="slow">
         <p:fade/>
+      </p:transition>
+    </mc:Fallback>
+  </mc:AlternateContent>
+  <p:timing>
+    <p:tnLst>
+      <p:par>
+        <p:cTn id="1" dur="indefinite" restart="never" nodeType="tmRoot"/>
+      </p:par>
+    </p:tnLst>
+  </p:timing>
+</p:sld>
+</file>
+
+<file path=ppt/slides/slide36.xml><?xml version="1.0" encoding="utf-8"?>
+<p:sld xmlns:a="http://schemas.openxmlformats.org/drawingml/2006/main" xmlns:r="http://schemas.openxmlformats.org/officeDocument/2006/relationships" xmlns:p="http://schemas.openxmlformats.org/presentationml/2006/main">
+  <p:cSld>
+    <p:spTree>
+      <p:nvGrpSpPr>
+        <p:cNvPr id="1" name=""/>
+        <p:cNvGrpSpPr/>
+        <p:nvPr/>
+      </p:nvGrpSpPr>
+      <p:grpSpPr>
+        <a:xfrm>
+          <a:off x="0" y="0"/>
+          <a:ext cx="0" cy="0"/>
+          <a:chOff x="0" y="0"/>
+          <a:chExt cx="0" cy="0"/>
+        </a:xfrm>
+      </p:grpSpPr>
+      <p:sp>
+        <p:nvSpPr>
+          <p:cNvPr id="5" name="Title 4"/>
+          <p:cNvSpPr>
+            <a:spLocks noGrp="1"/>
+          </p:cNvSpPr>
+          <p:nvPr>
+            <p:ph type="title"/>
+          </p:nvPr>
+        </p:nvSpPr>
+        <p:spPr>
+          <a:xfrm>
+            <a:off x="626364" y="155688"/>
+            <a:ext cx="7891272" cy="457200"/>
+          </a:xfrm>
+        </p:spPr>
+        <p:txBody>
+          <a:bodyPr/>
+          <a:lstStyle/>
+          <a:p>
+            <a:r>
+              <a:rPr lang="en-US" dirty="0"/>
+              <a:t>Your Feedback Counts!</a:t>
+            </a:r>
+          </a:p>
+        </p:txBody>
+      </p:sp>
+      <p:sp>
+        <p:nvSpPr>
+          <p:cNvPr id="9" name="Text Placeholder 8"/>
+          <p:cNvSpPr>
+            <a:spLocks noGrp="1"/>
+          </p:cNvSpPr>
+          <p:nvPr>
+            <p:ph type="body" sz="quarter" idx="11"/>
+          </p:nvPr>
+        </p:nvSpPr>
+        <p:spPr>
+          <a:xfrm flipH="1">
+            <a:off x="534407" y="994069"/>
+            <a:ext cx="8075184" cy="628970"/>
+          </a:xfrm>
+        </p:spPr>
+        <p:txBody>
+          <a:bodyPr/>
+          <a:lstStyle/>
+          <a:p>
+            <a:r>
+              <a:rPr lang="en-US" sz="2400" dirty="0"/>
+              <a:t>Don't forget to complete the session survey</a:t>
+            </a:r>
+            <a:br>
+              <a:rPr lang="en-US" sz="2400" dirty="0"/>
+            </a:br>
+            <a:r>
+              <a:rPr lang="en-US" sz="2400" dirty="0"/>
+              <a:t>in your conference mobile app. </a:t>
+            </a:r>
+          </a:p>
+        </p:txBody>
+      </p:sp>
+      <p:sp>
+        <p:nvSpPr>
+          <p:cNvPr id="6" name="Content Placeholder 5"/>
+          <p:cNvSpPr>
+            <a:spLocks noGrp="1"/>
+          </p:cNvSpPr>
+          <p:nvPr>
+            <p:ph sz="quarter" idx="12"/>
+          </p:nvPr>
+        </p:nvSpPr>
+        <p:spPr>
+          <a:xfrm>
+            <a:off x="908758" y="1863508"/>
+            <a:ext cx="7326483" cy="2251981"/>
+          </a:xfrm>
+        </p:spPr>
+        <p:txBody>
+          <a:bodyPr>
+            <a:noAutofit/>
+          </a:bodyPr>
+          <a:lstStyle/>
+          <a:p>
+            <a:pPr marL="457200" indent="-457200">
+              <a:spcAft>
+                <a:spcPts val="1200"/>
+              </a:spcAft>
+              <a:buFont typeface="+mj-lt"/>
+              <a:buAutoNum type="arabicPeriod"/>
+            </a:pPr>
+            <a:r>
+              <a:rPr lang="en-US" dirty="0"/>
+              <a:t>Go to the Agenda icon in the conference app.</a:t>
+            </a:r>
+          </a:p>
+          <a:p>
+            <a:pPr marL="457200" indent="-457200">
+              <a:spcAft>
+                <a:spcPts val="1200"/>
+              </a:spcAft>
+              <a:buFont typeface="+mj-lt"/>
+              <a:buAutoNum type="arabicPeriod"/>
+            </a:pPr>
+            <a:r>
+              <a:rPr lang="en-US" dirty="0"/>
+              <a:t>Find this session title and select it. </a:t>
+            </a:r>
+          </a:p>
+          <a:p>
+            <a:pPr marL="457200" indent="-457200">
+              <a:spcAft>
+                <a:spcPts val="1200"/>
+              </a:spcAft>
+              <a:buFont typeface="+mj-lt"/>
+              <a:buAutoNum type="arabicPeriod"/>
+            </a:pPr>
+            <a:r>
+              <a:rPr lang="en-US" dirty="0"/>
+              <a:t>On the Sessions page, scroll down to Surveys and select the name of the survey. </a:t>
+            </a:r>
+          </a:p>
+          <a:p>
+            <a:pPr marL="457200" indent="-457200">
+              <a:spcAft>
+                <a:spcPts val="1200"/>
+              </a:spcAft>
+              <a:buFont typeface="+mj-lt"/>
+              <a:buAutoNum type="arabicPeriod"/>
+            </a:pPr>
+            <a:r>
+              <a:rPr lang="en-US" dirty="0"/>
+              <a:t>Complete the survey and click Finish. </a:t>
+            </a:r>
+          </a:p>
+        </p:txBody>
+      </p:sp>
+    </p:spTree>
+    <p:extLst>
+      <p:ext uri="{BB962C8B-B14F-4D97-AF65-F5344CB8AC3E}">
+        <p14:creationId xmlns:p14="http://schemas.microsoft.com/office/powerpoint/2010/main" val="76914611"/>
+      </p:ext>
+    </p:extLst>
+  </p:cSld>
+  <p:clrMapOvr>
+    <a:masterClrMapping/>
+  </p:clrMapOvr>
+  <mc:AlternateContent xmlns:mc="http://schemas.openxmlformats.org/markup-compatibility/2006">
+    <mc:Choice xmlns:p14="http://schemas.microsoft.com/office/powerpoint/2010/main" Requires="p14">
+      <p:transition spd="slow" p14:dur="1200">
+        <p14:prism/>
+      </p:transition>
+    </mc:Choice>
+    <mc:Fallback>
+      <p:transition spd="slow">
+        <p:fade/>
+      </p:transition>
+    </mc:Fallback>
+  </mc:AlternateContent>
+  <p:timing>
+    <p:tnLst>
+      <p:par>
+        <p:cTn id="1" dur="indefinite" restart="never" nodeType="tmRoot"/>
+      </p:par>
+    </p:tnLst>
+  </p:timing>
+</p:sld>
+</file>
+
+<file path=ppt/slides/slide37.xml><?xml version="1.0" encoding="utf-8"?>
+<p:sld xmlns:a="http://schemas.openxmlformats.org/drawingml/2006/main" xmlns:r="http://schemas.openxmlformats.org/officeDocument/2006/relationships" xmlns:p="http://schemas.openxmlformats.org/presentationml/2006/main">
+  <p:cSld>
+    <p:spTree>
+      <p:nvGrpSpPr>
+        <p:cNvPr id="1" name=""/>
+        <p:cNvGrpSpPr/>
+        <p:nvPr/>
+      </p:nvGrpSpPr>
+      <p:grpSpPr>
+        <a:xfrm>
+          <a:off x="0" y="0"/>
+          <a:ext cx="0" cy="0"/>
+          <a:chOff x="0" y="0"/>
+          <a:chExt cx="0" cy="0"/>
+        </a:xfrm>
+      </p:grpSpPr>
+    </p:spTree>
+    <p:extLst>
+      <p:ext uri="{BB962C8B-B14F-4D97-AF65-F5344CB8AC3E}">
+        <p14:creationId xmlns:p14="http://schemas.microsoft.com/office/powerpoint/2010/main" val="197467808"/>
+      </p:ext>
+    </p:extLst>
+  </p:cSld>
+  <p:clrMapOvr>
+    <a:masterClrMapping/>
+  </p:clrMapOvr>
+  <mc:AlternateContent xmlns:mc="http://schemas.openxmlformats.org/markup-compatibility/2006">
+    <mc:Choice xmlns:p14="http://schemas.microsoft.com/office/powerpoint/2010/main" Requires="p14">
+      <p:transition spd="slow" p14:dur="2500" advClick="0">
+        <p:zoom/>
+      </p:transition>
+    </mc:Choice>
+    <mc:Fallback>
+      <p:transition spd="slow" advClick="0">
+        <p:zoom/>
       </p:transition>
     </mc:Fallback>
   </mc:AlternateContent>
@@ -27371,7 +27234,7 @@
         <p:spPr bwMode="auto">
           <a:xfrm>
             <a:off x="0" y="995192"/>
-            <a:ext cx="9144000" cy="1543056"/>
+            <a:ext cx="9144000" cy="1071641"/>
           </a:xfrm>
           <a:prstGeom prst="rect">
             <a:avLst/>
@@ -27453,7 +27316,7 @@
           <a:p>
             <a:pPr algn="ctr"/>
             <a:r>
-              <a:rPr lang="en-GB" sz="2000" b="1" dirty="0">
+              <a:rPr lang="en-GB" sz="1600" b="1" dirty="0">
                 <a:solidFill>
                   <a:srgbClr val="022F94"/>
                 </a:solidFill>
@@ -27467,7 +27330,7 @@
                 <a:latin typeface="Arial" panose="020B0604020202020204" pitchFamily="34" charset="0"/>
                 <a:cs typeface="Arial" panose="020B0604020202020204" pitchFamily="34" charset="0"/>
               </a:rPr>
-              <a:t>http://www.sascommunity.org/wiki/Excelling_to_Another_Level_with_SAS</a:t>
+              <a:t>https://github.com/FriedEgg/Papers/tree/master/Excelling_to_Another_Level_with_SAS/doc</a:t>
             </a:r>
           </a:p>
         </p:txBody>
@@ -27551,7 +27414,7 @@
       </p:cxnSp>
       <p:pic>
         <p:nvPicPr>
-          <p:cNvPr id="1026" name="Picture 2"/>
+          <p:cNvPr id="2" name="Picture 2"/>
           <p:cNvPicPr>
             <a:picLocks noChangeAspect="1" noChangeArrowheads="1"/>
           </p:cNvPicPr>
@@ -27572,8 +27435,8 @@
         </p:blipFill>
         <p:spPr bwMode="auto">
           <a:xfrm>
-            <a:off x="3296704" y="2146088"/>
-            <a:ext cx="2543668" cy="2543668"/>
+            <a:off x="3488348" y="1943745"/>
+            <a:ext cx="1918921" cy="1912394"/>
           </a:xfrm>
           <a:prstGeom prst="rect">
             <a:avLst/>
@@ -27603,6 +27466,95 @@
           </a:extLst>
         </p:spPr>
       </p:pic>
+      <p:sp>
+        <p:nvSpPr>
+          <p:cNvPr id="7" name="Rectangle 12"/>
+          <p:cNvSpPr>
+            <a:spLocks noChangeArrowheads="1"/>
+          </p:cNvSpPr>
+          <p:nvPr/>
+        </p:nvSpPr>
+        <p:spPr bwMode="auto">
+          <a:xfrm>
+            <a:off x="2936" y="3917072"/>
+            <a:ext cx="9144000" cy="452697"/>
+          </a:xfrm>
+          <a:prstGeom prst="rect">
+            <a:avLst/>
+          </a:prstGeom>
+          <a:noFill/>
+          <a:ln>
+            <a:noFill/>
+          </a:ln>
+          <a:effectLst/>
+          <a:extLst>
+            <a:ext uri="{909E8E84-426E-40DD-AFC4-6F175D3DCCD1}">
+              <a14:hiddenFill xmlns:a14="http://schemas.microsoft.com/office/drawing/2010/main">
+                <a:solidFill>
+                  <a:schemeClr val="accent1"/>
+                </a:solidFill>
+              </a14:hiddenFill>
+            </a:ext>
+            <a:ext uri="{91240B29-F687-4F45-9708-019B960494DF}">
+              <a14:hiddenLine xmlns:a14="http://schemas.microsoft.com/office/drawing/2010/main" w="9525">
+                <a:solidFill>
+                  <a:schemeClr val="tx1"/>
+                </a:solidFill>
+                <a:miter lim="800000"/>
+                <a:headEnd/>
+                <a:tailEnd/>
+              </a14:hiddenLine>
+            </a:ext>
+            <a:ext uri="{AF507438-7753-43E0-B8FC-AC1667EBCBE1}">
+              <a14:hiddenEffects xmlns:a14="http://schemas.microsoft.com/office/drawing/2010/main">
+                <a:effectLst>
+                  <a:outerShdw dist="35921" dir="2700000" algn="ctr" rotWithShape="0">
+                    <a:schemeClr val="bg2"/>
+                  </a:outerShdw>
+                </a:effectLst>
+              </a14:hiddenEffects>
+            </a:ext>
+          </a:extLst>
+        </p:spPr>
+        <p:txBody>
+          <a:bodyPr/>
+          <a:lstStyle/>
+          <a:p>
+            <a:pPr algn="ctr"/>
+            <a:r>
+              <a:rPr lang="en-GB" b="1" dirty="0" smtClean="0">
+                <a:solidFill>
+                  <a:srgbClr val="022F94"/>
+                </a:solidFill>
+                <a:effectLst>
+                  <a:outerShdw blurRad="38100" dist="38100" dir="2700000" algn="tl">
+                    <a:srgbClr val="000000">
+                      <a:alpha val="43137"/>
+                    </a:srgbClr>
+                  </a:outerShdw>
+                </a:effectLst>
+                <a:latin typeface="Arial" panose="020B0604020202020204" pitchFamily="34" charset="0"/>
+                <a:cs typeface="Arial" panose="020B0604020202020204" pitchFamily="34" charset="0"/>
+              </a:rPr>
+              <a:t>The page includes the paper, this powerpoint, the macro, and a tip sheet </a:t>
+            </a:r>
+            <a:endParaRPr lang="en-GB" sz="1600" b="1" dirty="0">
+              <a:solidFill>
+                <a:srgbClr val="022F94"/>
+              </a:solidFill>
+              <a:effectLst>
+                <a:outerShdw blurRad="38100" dist="38100" dir="2700000" algn="tl">
+                  <a:srgbClr val="000000">
+                    <a:alpha val="43137"/>
+                  </a:srgbClr>
+                </a:outerShdw>
+              </a:effectLst>
+              <a:latin typeface="Arial" panose="020B0604020202020204" pitchFamily="34" charset="0"/>
+              <a:cs typeface="Arial" panose="020B0604020202020204" pitchFamily="34" charset="0"/>
+            </a:endParaRPr>
+          </a:p>
+        </p:txBody>
+      </p:sp>
     </p:spTree>
     <p:extLst>
       <p:ext uri="{BB962C8B-B14F-4D97-AF65-F5344CB8AC3E}">
@@ -30058,7 +30010,7 @@
   <a:extraClrSchemeLst/>
   <a:extLst>
     <a:ext uri="{05A4C25C-085E-4340-85A3-A5531E510DB2}">
-      <thm15:themeFamily xmlns:thm15="http://schemas.microsoft.com/office/thememl/2012/main" name="SAS-External-16x9" id="{C1EFCE6E-4A51-8F45-86D3-D8C239ACF85F}" vid="{C711A0A3-BFA7-1C4B-88B4-5E2549CF554C}"/>
+      <thm15:themeFamily xmlns="" xmlns:thm15="http://schemas.microsoft.com/office/thememl/2012/main" name="SAS-External-16x9" id="{C1EFCE6E-4A51-8F45-86D3-D8C239ACF85F}" vid="{C711A0A3-BFA7-1C4B-88B4-5E2549CF554C}"/>
     </a:ext>
   </a:extLst>
 </a:theme>

</xml_diff>